<commit_message>
Fixed a problem with byte2 source code and uploaded / updated lecture slides
Changed the ignore list for byte2 source code. Changes the cdv files
generated. 'Outcome' was missing.
</commit_message>
<xml_diff>
--- a/Lectures/4 Acquiring.pptx
+++ b/Lectures/4 Acquiring.pptx
@@ -5,10 +5,10 @@
     <p:sldMasterId id="2147483648" r:id="rId1"/>
   </p:sldMasterIdLst>
   <p:notesMasterIdLst>
-    <p:notesMasterId r:id="rId40"/>
+    <p:notesMasterId r:id="rId41"/>
   </p:notesMasterIdLst>
   <p:handoutMasterIdLst>
-    <p:handoutMasterId r:id="rId41"/>
+    <p:handoutMasterId r:id="rId42"/>
   </p:handoutMasterIdLst>
   <p:sldIdLst>
     <p:sldId id="256" r:id="rId2"/>
@@ -28,27 +28,28 @@
     <p:sldId id="438" r:id="rId16"/>
     <p:sldId id="439" r:id="rId17"/>
     <p:sldId id="430" r:id="rId18"/>
-    <p:sldId id="452" r:id="rId19"/>
-    <p:sldId id="453" r:id="rId20"/>
-    <p:sldId id="454" r:id="rId21"/>
-    <p:sldId id="455" r:id="rId22"/>
-    <p:sldId id="457" r:id="rId23"/>
-    <p:sldId id="456" r:id="rId24"/>
-    <p:sldId id="458" r:id="rId25"/>
-    <p:sldId id="459" r:id="rId26"/>
-    <p:sldId id="460" r:id="rId27"/>
-    <p:sldId id="463" r:id="rId28"/>
-    <p:sldId id="464" r:id="rId29"/>
-    <p:sldId id="465" r:id="rId30"/>
-    <p:sldId id="466" r:id="rId31"/>
-    <p:sldId id="471" r:id="rId32"/>
-    <p:sldId id="472" r:id="rId33"/>
-    <p:sldId id="473" r:id="rId34"/>
-    <p:sldId id="474" r:id="rId35"/>
-    <p:sldId id="476" r:id="rId36"/>
-    <p:sldId id="475" r:id="rId37"/>
-    <p:sldId id="477" r:id="rId38"/>
-    <p:sldId id="478" r:id="rId39"/>
+    <p:sldId id="479" r:id="rId19"/>
+    <p:sldId id="452" r:id="rId20"/>
+    <p:sldId id="453" r:id="rId21"/>
+    <p:sldId id="454" r:id="rId22"/>
+    <p:sldId id="455" r:id="rId23"/>
+    <p:sldId id="457" r:id="rId24"/>
+    <p:sldId id="456" r:id="rId25"/>
+    <p:sldId id="458" r:id="rId26"/>
+    <p:sldId id="459" r:id="rId27"/>
+    <p:sldId id="460" r:id="rId28"/>
+    <p:sldId id="463" r:id="rId29"/>
+    <p:sldId id="464" r:id="rId30"/>
+    <p:sldId id="465" r:id="rId31"/>
+    <p:sldId id="466" r:id="rId32"/>
+    <p:sldId id="471" r:id="rId33"/>
+    <p:sldId id="472" r:id="rId34"/>
+    <p:sldId id="473" r:id="rId35"/>
+    <p:sldId id="474" r:id="rId36"/>
+    <p:sldId id="476" r:id="rId37"/>
+    <p:sldId id="475" r:id="rId38"/>
+    <p:sldId id="477" r:id="rId39"/>
+    <p:sldId id="478" r:id="rId40"/>
   </p:sldIdLst>
   <p:sldSz cx="9144000" cy="6858000" type="screen4x3"/>
   <p:notesSz cx="6858000" cy="9144000"/>
@@ -264,11 +265,11 @@
           <c:showBubbleSize val="0"/>
         </c:dLbls>
         <c:gapWidth val="150"/>
-        <c:axId val="2085785224"/>
-        <c:axId val="2086527544"/>
+        <c:axId val="-2108129960"/>
+        <c:axId val="-2144645304"/>
       </c:barChart>
       <c:catAx>
-        <c:axId val="2085785224"/>
+        <c:axId val="-2108129960"/>
         <c:scaling>
           <c:orientation val="minMax"/>
         </c:scaling>
@@ -278,7 +279,7 @@
         <c:majorTickMark val="out"/>
         <c:minorTickMark val="none"/>
         <c:tickLblPos val="nextTo"/>
-        <c:crossAx val="2086527544"/>
+        <c:crossAx val="-2144645304"/>
         <c:crosses val="autoZero"/>
         <c:auto val="1"/>
         <c:lblAlgn val="ctr"/>
@@ -286,7 +287,7 @@
         <c:noMultiLvlLbl val="0"/>
       </c:catAx>
       <c:valAx>
-        <c:axId val="2086527544"/>
+        <c:axId val="-2144645304"/>
         <c:scaling>
           <c:orientation val="minMax"/>
         </c:scaling>
@@ -297,7 +298,7 @@
         <c:majorTickMark val="out"/>
         <c:minorTickMark val="none"/>
         <c:tickLblPos val="nextTo"/>
-        <c:crossAx val="2085785224"/>
+        <c:crossAx val="-2108129960"/>
         <c:crosses val="autoZero"/>
         <c:crossBetween val="between"/>
       </c:valAx>
@@ -442,11 +443,11 @@
           <c:showBubbleSize val="0"/>
         </c:dLbls>
         <c:gapWidth val="150"/>
-        <c:axId val="2145408712"/>
-        <c:axId val="2086076520"/>
+        <c:axId val="-2142134520"/>
+        <c:axId val="-2108421384"/>
       </c:barChart>
       <c:catAx>
-        <c:axId val="2145408712"/>
+        <c:axId val="-2142134520"/>
         <c:scaling>
           <c:orientation val="minMax"/>
         </c:scaling>
@@ -456,7 +457,7 @@
         <c:majorTickMark val="out"/>
         <c:minorTickMark val="none"/>
         <c:tickLblPos val="nextTo"/>
-        <c:crossAx val="2086076520"/>
+        <c:crossAx val="-2108421384"/>
         <c:crosses val="autoZero"/>
         <c:auto val="1"/>
         <c:lblAlgn val="ctr"/>
@@ -464,7 +465,7 @@
         <c:noMultiLvlLbl val="0"/>
       </c:catAx>
       <c:valAx>
-        <c:axId val="2086076520"/>
+        <c:axId val="-2108421384"/>
         <c:scaling>
           <c:orientation val="minMax"/>
         </c:scaling>
@@ -475,7 +476,7 @@
         <c:majorTickMark val="out"/>
         <c:minorTickMark val="none"/>
         <c:tickLblPos val="nextTo"/>
-        <c:crossAx val="2145408712"/>
+        <c:crossAx val="-2142134520"/>
         <c:crosses val="autoZero"/>
         <c:crossBetween val="between"/>
       </c:valAx>
@@ -619,11 +620,11 @@
           <c:showBubbleSize val="0"/>
         </c:dLbls>
         <c:gapWidth val="150"/>
-        <c:axId val="2145415848"/>
-        <c:axId val="2145421544"/>
+        <c:axId val="2122756472"/>
+        <c:axId val="-2144437960"/>
       </c:barChart>
       <c:catAx>
-        <c:axId val="2145415848"/>
+        <c:axId val="2122756472"/>
         <c:scaling>
           <c:orientation val="minMax"/>
         </c:scaling>
@@ -633,7 +634,7 @@
         <c:majorTickMark val="out"/>
         <c:minorTickMark val="none"/>
         <c:tickLblPos val="nextTo"/>
-        <c:crossAx val="2145421544"/>
+        <c:crossAx val="-2144437960"/>
         <c:crosses val="autoZero"/>
         <c:auto val="1"/>
         <c:lblAlgn val="ctr"/>
@@ -641,7 +642,7 @@
         <c:noMultiLvlLbl val="0"/>
       </c:catAx>
       <c:valAx>
-        <c:axId val="2145421544"/>
+        <c:axId val="-2144437960"/>
         <c:scaling>
           <c:orientation val="minMax"/>
         </c:scaling>
@@ -652,7 +653,7 @@
         <c:majorTickMark val="out"/>
         <c:minorTickMark val="none"/>
         <c:tickLblPos val="nextTo"/>
-        <c:crossAx val="2145415848"/>
+        <c:crossAx val="2122756472"/>
         <c:crosses val="autoZero"/>
         <c:crossBetween val="between"/>
       </c:valAx>
@@ -791,11 +792,11 @@
           <c:showBubbleSize val="0"/>
         </c:dLbls>
         <c:gapWidth val="150"/>
-        <c:axId val="2051870216"/>
-        <c:axId val="2051873048"/>
+        <c:axId val="2122714008"/>
+        <c:axId val="-2105897528"/>
       </c:barChart>
       <c:catAx>
-        <c:axId val="2051870216"/>
+        <c:axId val="2122714008"/>
         <c:scaling>
           <c:orientation val="minMax"/>
         </c:scaling>
@@ -805,7 +806,7 @@
         <c:majorTickMark val="out"/>
         <c:minorTickMark val="none"/>
         <c:tickLblPos val="nextTo"/>
-        <c:crossAx val="2051873048"/>
+        <c:crossAx val="-2105897528"/>
         <c:crosses val="autoZero"/>
         <c:auto val="1"/>
         <c:lblAlgn val="ctr"/>
@@ -813,7 +814,7 @@
         <c:noMultiLvlLbl val="0"/>
       </c:catAx>
       <c:valAx>
-        <c:axId val="2051873048"/>
+        <c:axId val="-2105897528"/>
         <c:scaling>
           <c:orientation val="minMax"/>
         </c:scaling>
@@ -824,7 +825,7 @@
         <c:majorTickMark val="out"/>
         <c:minorTickMark val="none"/>
         <c:tickLblPos val="nextTo"/>
-        <c:crossAx val="2051870216"/>
+        <c:crossAx val="2122714008"/>
         <c:crosses val="autoZero"/>
         <c:crossBetween val="between"/>
       </c:valAx>
@@ -968,11 +969,11 @@
           <c:showBubbleSize val="0"/>
         </c:dLbls>
         <c:gapWidth val="150"/>
-        <c:axId val="2051136456"/>
-        <c:axId val="2138900456"/>
+        <c:axId val="-2145189224"/>
+        <c:axId val="-2105888296"/>
       </c:barChart>
       <c:catAx>
-        <c:axId val="2051136456"/>
+        <c:axId val="-2145189224"/>
         <c:scaling>
           <c:orientation val="minMax"/>
         </c:scaling>
@@ -982,7 +983,7 @@
         <c:majorTickMark val="out"/>
         <c:minorTickMark val="none"/>
         <c:tickLblPos val="nextTo"/>
-        <c:crossAx val="2138900456"/>
+        <c:crossAx val="-2105888296"/>
         <c:crosses val="autoZero"/>
         <c:auto val="1"/>
         <c:lblAlgn val="ctr"/>
@@ -990,7 +991,7 @@
         <c:noMultiLvlLbl val="0"/>
       </c:catAx>
       <c:valAx>
-        <c:axId val="2138900456"/>
+        <c:axId val="-2105888296"/>
         <c:scaling>
           <c:orientation val="minMax"/>
         </c:scaling>
@@ -1001,7 +1002,7 @@
         <c:majorTickMark val="out"/>
         <c:minorTickMark val="none"/>
         <c:tickLblPos val="nextTo"/>
-        <c:crossAx val="2051136456"/>
+        <c:crossAx val="-2145189224"/>
         <c:crosses val="autoZero"/>
         <c:crossBetween val="between"/>
       </c:valAx>
@@ -3887,21 +3888,21 @@
     </dgm:pt>
   </dgm:ptLst>
   <dgm:cxnLst>
+    <dgm:cxn modelId="{BA662F92-01F8-D14F-9F10-8AE4A9407726}" srcId="{42D81CF2-D02F-8946-A6A0-250E7F3040E9}" destId="{92C49E94-34E0-2A41-8484-A9D4F6DBE1EA}" srcOrd="1" destOrd="0" parTransId="{C0331582-F413-5A41-B2B4-C489DB110E52}" sibTransId="{C604A724-87C4-1641-A5C5-F019D2713951}"/>
+    <dgm:cxn modelId="{6B1B9265-D71A-4B43-A0BA-4E7587087536}" type="presOf" srcId="{999B656F-DBDB-1943-B9F0-158C78A32C17}" destId="{F5CF512E-1AD1-724E-B731-57D66E80D6A5}" srcOrd="0" destOrd="0" presId="urn:microsoft.com/office/officeart/2005/8/layout/process1"/>
+    <dgm:cxn modelId="{66C90A28-5D58-6B4D-8855-2FB6C7CF06A0}" type="presOf" srcId="{999B656F-DBDB-1943-B9F0-158C78A32C17}" destId="{FF9EC301-3A68-DB43-BD0C-9F7120F18039}" srcOrd="1" destOrd="0" presId="urn:microsoft.com/office/officeart/2005/8/layout/process1"/>
     <dgm:cxn modelId="{2AF0BD6B-3020-AF41-A4B7-D21A3AF90E7D}" srcId="{42D81CF2-D02F-8946-A6A0-250E7F3040E9}" destId="{AA2EE4C4-2672-134B-A10E-24D0479226FD}" srcOrd="3" destOrd="0" parTransId="{A6FFB85A-5C65-C140-8402-F4F7A1FF496F}" sibTransId="{58173E36-07EF-544F-9A6E-0BAD533990FB}"/>
-    <dgm:cxn modelId="{70EE953C-8C35-214C-8B87-AFEEC8AA50C2}" type="presOf" srcId="{41B4A8F1-D113-5043-97A8-B6918095381E}" destId="{065B5A47-903E-9447-B9AD-6A34AC3DDA25}" srcOrd="1" destOrd="0" presId="urn:microsoft.com/office/officeart/2005/8/layout/process1"/>
     <dgm:cxn modelId="{BFAAAB81-2D07-2D4D-B071-112F3B794C97}" type="presOf" srcId="{C604A724-87C4-1641-A5C5-F019D2713951}" destId="{2A7A451B-E7CD-E64D-AD4D-C64E7A1F1921}" srcOrd="0" destOrd="0" presId="urn:microsoft.com/office/officeart/2005/8/layout/process1"/>
-    <dgm:cxn modelId="{8C05F526-F850-B845-8567-E9F9CD03A954}" srcId="{42D81CF2-D02F-8946-A6A0-250E7F3040E9}" destId="{15E5BE46-E928-244B-ABAC-F1543116E095}" srcOrd="0" destOrd="0" parTransId="{D4B17A15-ACC4-6B43-A7F6-1D9A3DFA0923}" sibTransId="{41B4A8F1-D113-5043-97A8-B6918095381E}"/>
+    <dgm:cxn modelId="{42933CA1-4067-E846-A887-1753D1268404}" srcId="{42D81CF2-D02F-8946-A6A0-250E7F3040E9}" destId="{D9842041-711C-A44C-B6A1-D37EE5D5EFEB}" srcOrd="2" destOrd="0" parTransId="{F9EC1153-7029-E14A-A0A6-1EBECDFB9FAF}" sibTransId="{999B656F-DBDB-1943-B9F0-158C78A32C17}"/>
+    <dgm:cxn modelId="{EB2BE677-8729-1643-8A56-B0E4C27AC6F5}" type="presOf" srcId="{AA2EE4C4-2672-134B-A10E-24D0479226FD}" destId="{7E47C9EC-8142-0A4E-AFBC-EADB5E13AA35}" srcOrd="0" destOrd="0" presId="urn:microsoft.com/office/officeart/2005/8/layout/process1"/>
     <dgm:cxn modelId="{BCDB28A5-AE91-944F-97DE-19EF83304FF2}" type="presOf" srcId="{42D81CF2-D02F-8946-A6A0-250E7F3040E9}" destId="{7CEEF8E4-3ADE-574C-B72A-56E56D8BE911}" srcOrd="0" destOrd="0" presId="urn:microsoft.com/office/officeart/2005/8/layout/process1"/>
+    <dgm:cxn modelId="{2907D63B-CF60-8A4D-B679-8A52E183ABEC}" type="presOf" srcId="{92C49E94-34E0-2A41-8484-A9D4F6DBE1EA}" destId="{42089EA5-C142-AD42-ABE6-822B746D7A0F}" srcOrd="0" destOrd="0" presId="urn:microsoft.com/office/officeart/2005/8/layout/process1"/>
+    <dgm:cxn modelId="{23C97F09-78AD-5D4E-A653-C222BF7E4385}" type="presOf" srcId="{15E5BE46-E928-244B-ABAC-F1543116E095}" destId="{5A21B2CD-C375-9247-88ED-4CC1CA1865D3}" srcOrd="0" destOrd="0" presId="urn:microsoft.com/office/officeart/2005/8/layout/process1"/>
     <dgm:cxn modelId="{2F83A802-D699-5743-B97D-A0280AB1D8FB}" type="presOf" srcId="{C604A724-87C4-1641-A5C5-F019D2713951}" destId="{481EE52C-64FC-CD48-9660-37F8016BDD19}" srcOrd="1" destOrd="0" presId="urn:microsoft.com/office/officeart/2005/8/layout/process1"/>
-    <dgm:cxn modelId="{66C90A28-5D58-6B4D-8855-2FB6C7CF06A0}" type="presOf" srcId="{999B656F-DBDB-1943-B9F0-158C78A32C17}" destId="{FF9EC301-3A68-DB43-BD0C-9F7120F18039}" srcOrd="1" destOrd="0" presId="urn:microsoft.com/office/officeart/2005/8/layout/process1"/>
-    <dgm:cxn modelId="{BA662F92-01F8-D14F-9F10-8AE4A9407726}" srcId="{42D81CF2-D02F-8946-A6A0-250E7F3040E9}" destId="{92C49E94-34E0-2A41-8484-A9D4F6DBE1EA}" srcOrd="1" destOrd="0" parTransId="{C0331582-F413-5A41-B2B4-C489DB110E52}" sibTransId="{C604A724-87C4-1641-A5C5-F019D2713951}"/>
-    <dgm:cxn modelId="{23C97F09-78AD-5D4E-A653-C222BF7E4385}" type="presOf" srcId="{15E5BE46-E928-244B-ABAC-F1543116E095}" destId="{5A21B2CD-C375-9247-88ED-4CC1CA1865D3}" srcOrd="0" destOrd="0" presId="urn:microsoft.com/office/officeart/2005/8/layout/process1"/>
-    <dgm:cxn modelId="{2907D63B-CF60-8A4D-B679-8A52E183ABEC}" type="presOf" srcId="{92C49E94-34E0-2A41-8484-A9D4F6DBE1EA}" destId="{42089EA5-C142-AD42-ABE6-822B746D7A0F}" srcOrd="0" destOrd="0" presId="urn:microsoft.com/office/officeart/2005/8/layout/process1"/>
-    <dgm:cxn modelId="{EB2BE677-8729-1643-8A56-B0E4C27AC6F5}" type="presOf" srcId="{AA2EE4C4-2672-134B-A10E-24D0479226FD}" destId="{7E47C9EC-8142-0A4E-AFBC-EADB5E13AA35}" srcOrd="0" destOrd="0" presId="urn:microsoft.com/office/officeart/2005/8/layout/process1"/>
-    <dgm:cxn modelId="{6B1B9265-D71A-4B43-A0BA-4E7587087536}" type="presOf" srcId="{999B656F-DBDB-1943-B9F0-158C78A32C17}" destId="{F5CF512E-1AD1-724E-B731-57D66E80D6A5}" srcOrd="0" destOrd="0" presId="urn:microsoft.com/office/officeart/2005/8/layout/process1"/>
-    <dgm:cxn modelId="{42933CA1-4067-E846-A887-1753D1268404}" srcId="{42D81CF2-D02F-8946-A6A0-250E7F3040E9}" destId="{D9842041-711C-A44C-B6A1-D37EE5D5EFEB}" srcOrd="2" destOrd="0" parTransId="{F9EC1153-7029-E14A-A0A6-1EBECDFB9FAF}" sibTransId="{999B656F-DBDB-1943-B9F0-158C78A32C17}"/>
     <dgm:cxn modelId="{A93FF16B-29D3-F24D-A5A6-D0EB5DD75A26}" type="presOf" srcId="{41B4A8F1-D113-5043-97A8-B6918095381E}" destId="{D61D47EA-EEF1-D144-915B-077C3FC305EF}" srcOrd="0" destOrd="0" presId="urn:microsoft.com/office/officeart/2005/8/layout/process1"/>
     <dgm:cxn modelId="{320DA76E-CADD-6A44-9E76-A70B82584731}" type="presOf" srcId="{D9842041-711C-A44C-B6A1-D37EE5D5EFEB}" destId="{143E674D-5043-1445-B5BB-4AEACBE0136D}" srcOrd="0" destOrd="0" presId="urn:microsoft.com/office/officeart/2005/8/layout/process1"/>
+    <dgm:cxn modelId="{70EE953C-8C35-214C-8B87-AFEEC8AA50C2}" type="presOf" srcId="{41B4A8F1-D113-5043-97A8-B6918095381E}" destId="{065B5A47-903E-9447-B9AD-6A34AC3DDA25}" srcOrd="1" destOrd="0" presId="urn:microsoft.com/office/officeart/2005/8/layout/process1"/>
+    <dgm:cxn modelId="{8C05F526-F850-B845-8567-E9F9CD03A954}" srcId="{42D81CF2-D02F-8946-A6A0-250E7F3040E9}" destId="{15E5BE46-E928-244B-ABAC-F1543116E095}" srcOrd="0" destOrd="0" parTransId="{D4B17A15-ACC4-6B43-A7F6-1D9A3DFA0923}" sibTransId="{41B4A8F1-D113-5043-97A8-B6918095381E}"/>
     <dgm:cxn modelId="{7ECC8D6E-3D37-884E-B922-B165C228E4C9}" type="presParOf" srcId="{7CEEF8E4-3ADE-574C-B72A-56E56D8BE911}" destId="{5A21B2CD-C375-9247-88ED-4CC1CA1865D3}" srcOrd="0" destOrd="0" presId="urn:microsoft.com/office/officeart/2005/8/layout/process1"/>
     <dgm:cxn modelId="{C152567D-44E3-5141-81CA-11C570A30D27}" type="presParOf" srcId="{7CEEF8E4-3ADE-574C-B72A-56E56D8BE911}" destId="{D61D47EA-EEF1-D144-915B-077C3FC305EF}" srcOrd="1" destOrd="0" presId="urn:microsoft.com/office/officeart/2005/8/layout/process1"/>
     <dgm:cxn modelId="{D264661C-AC3C-6B4D-9BE8-07057D2FC806}" type="presParOf" srcId="{D61D47EA-EEF1-D144-915B-077C3FC305EF}" destId="{065B5A47-903E-9447-B9AD-6A34AC3DDA25}" srcOrd="0" destOrd="0" presId="urn:microsoft.com/office/officeart/2005/8/layout/process1"/>
@@ -5413,571 +5414,6 @@
       <dsp:cNvGrpSpPr/>
     </dsp:nvGrpSpPr>
     <dsp:grpSpPr/>
-    <dsp:sp modelId="{5A21B2CD-C375-9247-88ED-4CC1CA1865D3}">
-      <dsp:nvSpPr>
-        <dsp:cNvPr id="0" name=""/>
-        <dsp:cNvSpPr/>
-      </dsp:nvSpPr>
-      <dsp:spPr>
-        <a:xfrm>
-          <a:off x="3652" y="2043297"/>
-          <a:ext cx="1597147" cy="1227806"/>
-        </a:xfrm>
-        <a:prstGeom prst="roundRect">
-          <a:avLst>
-            <a:gd name="adj" fmla="val 10000"/>
-          </a:avLst>
-        </a:prstGeom>
-        <a:solidFill>
-          <a:schemeClr val="accent1">
-            <a:hueOff val="0"/>
-            <a:satOff val="0"/>
-            <a:lumOff val="0"/>
-            <a:alphaOff val="0"/>
-          </a:schemeClr>
-        </a:solidFill>
-        <a:ln w="38100" cap="flat" cmpd="sng" algn="ctr">
-          <a:solidFill>
-            <a:schemeClr val="lt1">
-              <a:hueOff val="0"/>
-              <a:satOff val="0"/>
-              <a:lumOff val="0"/>
-              <a:alphaOff val="0"/>
-            </a:schemeClr>
-          </a:solidFill>
-          <a:prstDash val="solid"/>
-        </a:ln>
-        <a:effectLst>
-          <a:outerShdw blurRad="40000" dist="20000" dir="5400000" rotWithShape="0">
-            <a:srgbClr val="000000">
-              <a:alpha val="38000"/>
-            </a:srgbClr>
-          </a:outerShdw>
-        </a:effectLst>
-      </dsp:spPr>
-      <dsp:style>
-        <a:lnRef idx="3">
-          <a:scrgbClr r="0" g="0" b="0"/>
-        </a:lnRef>
-        <a:fillRef idx="1">
-          <a:scrgbClr r="0" g="0" b="0"/>
-        </a:fillRef>
-        <a:effectRef idx="1">
-          <a:scrgbClr r="0" g="0" b="0"/>
-        </a:effectRef>
-        <a:fontRef idx="minor">
-          <a:schemeClr val="lt1"/>
-        </a:fontRef>
-      </dsp:style>
-      <dsp:txBody>
-        <a:bodyPr spcFirstLastPara="0" vert="horz" wrap="square" lIns="68580" tIns="68580" rIns="68580" bIns="68580" numCol="1" spcCol="1270" anchor="ctr" anchorCtr="0">
-          <a:noAutofit/>
-        </a:bodyPr>
-        <a:lstStyle/>
-        <a:p>
-          <a:pPr lvl="0" algn="ctr" defTabSz="800100">
-            <a:lnSpc>
-              <a:spcPct val="90000"/>
-            </a:lnSpc>
-            <a:spcBef>
-              <a:spcPct val="0"/>
-            </a:spcBef>
-            <a:spcAft>
-              <a:spcPct val="35000"/>
-            </a:spcAft>
-          </a:pPr>
-          <a:r>
-            <a:rPr lang="en-US" sz="1800" kern="1200" dirty="0" smtClean="0"/>
-            <a:t>Construct a URL</a:t>
-          </a:r>
-          <a:endParaRPr lang="en-US" sz="1800" kern="1200" dirty="0"/>
-        </a:p>
-      </dsp:txBody>
-      <dsp:txXfrm>
-        <a:off x="39613" y="2079258"/>
-        <a:ext cx="1525225" cy="1155884"/>
-      </dsp:txXfrm>
-    </dsp:sp>
-    <dsp:sp modelId="{D61D47EA-EEF1-D144-915B-077C3FC305EF}">
-      <dsp:nvSpPr>
-        <dsp:cNvPr id="0" name=""/>
-        <dsp:cNvSpPr/>
-      </dsp:nvSpPr>
-      <dsp:spPr>
-        <a:xfrm>
-          <a:off x="1760514" y="2459154"/>
-          <a:ext cx="338595" cy="396092"/>
-        </a:xfrm>
-        <a:prstGeom prst="rightArrow">
-          <a:avLst>
-            <a:gd name="adj1" fmla="val 60000"/>
-            <a:gd name="adj2" fmla="val 50000"/>
-          </a:avLst>
-        </a:prstGeom>
-        <a:solidFill>
-          <a:schemeClr val="accent1">
-            <a:tint val="60000"/>
-            <a:hueOff val="0"/>
-            <a:satOff val="0"/>
-            <a:lumOff val="0"/>
-            <a:alphaOff val="0"/>
-          </a:schemeClr>
-        </a:solidFill>
-        <a:ln>
-          <a:noFill/>
-        </a:ln>
-        <a:effectLst>
-          <a:outerShdw blurRad="40000" dist="20000" dir="5400000" rotWithShape="0">
-            <a:srgbClr val="000000">
-              <a:alpha val="38000"/>
-            </a:srgbClr>
-          </a:outerShdw>
-        </a:effectLst>
-      </dsp:spPr>
-      <dsp:style>
-        <a:lnRef idx="0">
-          <a:scrgbClr r="0" g="0" b="0"/>
-        </a:lnRef>
-        <a:fillRef idx="1">
-          <a:scrgbClr r="0" g="0" b="0"/>
-        </a:fillRef>
-        <a:effectRef idx="1">
-          <a:scrgbClr r="0" g="0" b="0"/>
-        </a:effectRef>
-        <a:fontRef idx="minor">
-          <a:schemeClr val="lt1"/>
-        </a:fontRef>
-      </dsp:style>
-      <dsp:txBody>
-        <a:bodyPr spcFirstLastPara="0" vert="horz" wrap="square" lIns="0" tIns="0" rIns="0" bIns="0" numCol="1" spcCol="1270" anchor="ctr" anchorCtr="0">
-          <a:noAutofit/>
-        </a:bodyPr>
-        <a:lstStyle/>
-        <a:p>
-          <a:pPr lvl="0" algn="ctr" defTabSz="622300">
-            <a:lnSpc>
-              <a:spcPct val="90000"/>
-            </a:lnSpc>
-            <a:spcBef>
-              <a:spcPct val="0"/>
-            </a:spcBef>
-            <a:spcAft>
-              <a:spcPct val="35000"/>
-            </a:spcAft>
-          </a:pPr>
-          <a:endParaRPr lang="en-US" sz="1400" kern="1200"/>
-        </a:p>
-      </dsp:txBody>
-      <dsp:txXfrm>
-        <a:off x="1760514" y="2538372"/>
-        <a:ext cx="237017" cy="237656"/>
-      </dsp:txXfrm>
-    </dsp:sp>
-    <dsp:sp modelId="{42089EA5-C142-AD42-ABE6-822B746D7A0F}">
-      <dsp:nvSpPr>
-        <dsp:cNvPr id="0" name=""/>
-        <dsp:cNvSpPr/>
-      </dsp:nvSpPr>
-      <dsp:spPr>
-        <a:xfrm>
-          <a:off x="2239658" y="2043297"/>
-          <a:ext cx="1597147" cy="1227806"/>
-        </a:xfrm>
-        <a:prstGeom prst="roundRect">
-          <a:avLst>
-            <a:gd name="adj" fmla="val 10000"/>
-          </a:avLst>
-        </a:prstGeom>
-        <a:solidFill>
-          <a:schemeClr val="accent1">
-            <a:hueOff val="0"/>
-            <a:satOff val="0"/>
-            <a:lumOff val="0"/>
-            <a:alphaOff val="0"/>
-          </a:schemeClr>
-        </a:solidFill>
-        <a:ln w="38100" cap="flat" cmpd="sng" algn="ctr">
-          <a:solidFill>
-            <a:schemeClr val="lt1">
-              <a:hueOff val="0"/>
-              <a:satOff val="0"/>
-              <a:lumOff val="0"/>
-              <a:alphaOff val="0"/>
-            </a:schemeClr>
-          </a:solidFill>
-          <a:prstDash val="solid"/>
-        </a:ln>
-        <a:effectLst>
-          <a:outerShdw blurRad="40000" dist="20000" dir="5400000" rotWithShape="0">
-            <a:srgbClr val="000000">
-              <a:alpha val="38000"/>
-            </a:srgbClr>
-          </a:outerShdw>
-        </a:effectLst>
-      </dsp:spPr>
-      <dsp:style>
-        <a:lnRef idx="3">
-          <a:scrgbClr r="0" g="0" b="0"/>
-        </a:lnRef>
-        <a:fillRef idx="1">
-          <a:scrgbClr r="0" g="0" b="0"/>
-        </a:fillRef>
-        <a:effectRef idx="1">
-          <a:scrgbClr r="0" g="0" b="0"/>
-        </a:effectRef>
-        <a:fontRef idx="minor">
-          <a:schemeClr val="lt1"/>
-        </a:fontRef>
-      </dsp:style>
-      <dsp:txBody>
-        <a:bodyPr spcFirstLastPara="0" vert="horz" wrap="square" lIns="68580" tIns="68580" rIns="68580" bIns="68580" numCol="1" spcCol="1270" anchor="ctr" anchorCtr="0">
-          <a:noAutofit/>
-        </a:bodyPr>
-        <a:lstStyle/>
-        <a:p>
-          <a:pPr lvl="0" algn="ctr" defTabSz="800100">
-            <a:lnSpc>
-              <a:spcPct val="90000"/>
-            </a:lnSpc>
-            <a:spcBef>
-              <a:spcPct val="0"/>
-            </a:spcBef>
-            <a:spcAft>
-              <a:spcPct val="35000"/>
-            </a:spcAft>
-          </a:pPr>
-          <a:r>
-            <a:rPr lang="en-US" sz="1800" kern="1200" dirty="0" smtClean="0"/>
-            <a:t>Post it to the Server</a:t>
-          </a:r>
-          <a:endParaRPr lang="en-US" sz="1800" kern="1200" dirty="0"/>
-        </a:p>
-      </dsp:txBody>
-      <dsp:txXfrm>
-        <a:off x="2275619" y="2079258"/>
-        <a:ext cx="1525225" cy="1155884"/>
-      </dsp:txXfrm>
-    </dsp:sp>
-    <dsp:sp modelId="{2A7A451B-E7CD-E64D-AD4D-C64E7A1F1921}">
-      <dsp:nvSpPr>
-        <dsp:cNvPr id="0" name=""/>
-        <dsp:cNvSpPr/>
-      </dsp:nvSpPr>
-      <dsp:spPr>
-        <a:xfrm>
-          <a:off x="3996520" y="2459154"/>
-          <a:ext cx="338595" cy="396092"/>
-        </a:xfrm>
-        <a:prstGeom prst="rightArrow">
-          <a:avLst>
-            <a:gd name="adj1" fmla="val 60000"/>
-            <a:gd name="adj2" fmla="val 50000"/>
-          </a:avLst>
-        </a:prstGeom>
-        <a:solidFill>
-          <a:schemeClr val="accent1">
-            <a:tint val="60000"/>
-            <a:hueOff val="0"/>
-            <a:satOff val="0"/>
-            <a:lumOff val="0"/>
-            <a:alphaOff val="0"/>
-          </a:schemeClr>
-        </a:solidFill>
-        <a:ln>
-          <a:noFill/>
-        </a:ln>
-        <a:effectLst>
-          <a:outerShdw blurRad="40000" dist="20000" dir="5400000" rotWithShape="0">
-            <a:srgbClr val="000000">
-              <a:alpha val="38000"/>
-            </a:srgbClr>
-          </a:outerShdw>
-        </a:effectLst>
-      </dsp:spPr>
-      <dsp:style>
-        <a:lnRef idx="0">
-          <a:scrgbClr r="0" g="0" b="0"/>
-        </a:lnRef>
-        <a:fillRef idx="1">
-          <a:scrgbClr r="0" g="0" b="0"/>
-        </a:fillRef>
-        <a:effectRef idx="1">
-          <a:scrgbClr r="0" g="0" b="0"/>
-        </a:effectRef>
-        <a:fontRef idx="minor">
-          <a:schemeClr val="lt1"/>
-        </a:fontRef>
-      </dsp:style>
-      <dsp:txBody>
-        <a:bodyPr spcFirstLastPara="0" vert="horz" wrap="square" lIns="0" tIns="0" rIns="0" bIns="0" numCol="1" spcCol="1270" anchor="ctr" anchorCtr="0">
-          <a:noAutofit/>
-        </a:bodyPr>
-        <a:lstStyle/>
-        <a:p>
-          <a:pPr lvl="0" algn="ctr" defTabSz="622300">
-            <a:lnSpc>
-              <a:spcPct val="90000"/>
-            </a:lnSpc>
-            <a:spcBef>
-              <a:spcPct val="0"/>
-            </a:spcBef>
-            <a:spcAft>
-              <a:spcPct val="35000"/>
-            </a:spcAft>
-          </a:pPr>
-          <a:endParaRPr lang="en-US" sz="1400" kern="1200"/>
-        </a:p>
-      </dsp:txBody>
-      <dsp:txXfrm>
-        <a:off x="3996520" y="2538372"/>
-        <a:ext cx="237017" cy="237656"/>
-      </dsp:txXfrm>
-    </dsp:sp>
-    <dsp:sp modelId="{143E674D-5043-1445-B5BB-4AEACBE0136D}">
-      <dsp:nvSpPr>
-        <dsp:cNvPr id="0" name=""/>
-        <dsp:cNvSpPr/>
-      </dsp:nvSpPr>
-      <dsp:spPr>
-        <a:xfrm>
-          <a:off x="4475664" y="2043297"/>
-          <a:ext cx="1597147" cy="1227806"/>
-        </a:xfrm>
-        <a:prstGeom prst="roundRect">
-          <a:avLst>
-            <a:gd name="adj" fmla="val 10000"/>
-          </a:avLst>
-        </a:prstGeom>
-        <a:solidFill>
-          <a:schemeClr val="accent1">
-            <a:hueOff val="0"/>
-            <a:satOff val="0"/>
-            <a:lumOff val="0"/>
-            <a:alphaOff val="0"/>
-          </a:schemeClr>
-        </a:solidFill>
-        <a:ln w="38100" cap="flat" cmpd="sng" algn="ctr">
-          <a:solidFill>
-            <a:schemeClr val="lt1">
-              <a:hueOff val="0"/>
-              <a:satOff val="0"/>
-              <a:lumOff val="0"/>
-              <a:alphaOff val="0"/>
-            </a:schemeClr>
-          </a:solidFill>
-          <a:prstDash val="solid"/>
-        </a:ln>
-        <a:effectLst>
-          <a:outerShdw blurRad="40000" dist="20000" dir="5400000" rotWithShape="0">
-            <a:srgbClr val="000000">
-              <a:alpha val="38000"/>
-            </a:srgbClr>
-          </a:outerShdw>
-        </a:effectLst>
-      </dsp:spPr>
-      <dsp:style>
-        <a:lnRef idx="3">
-          <a:scrgbClr r="0" g="0" b="0"/>
-        </a:lnRef>
-        <a:fillRef idx="1">
-          <a:scrgbClr r="0" g="0" b="0"/>
-        </a:fillRef>
-        <a:effectRef idx="1">
-          <a:scrgbClr r="0" g="0" b="0"/>
-        </a:effectRef>
-        <a:fontRef idx="minor">
-          <a:schemeClr val="lt1"/>
-        </a:fontRef>
-      </dsp:style>
-      <dsp:txBody>
-        <a:bodyPr spcFirstLastPara="0" vert="horz" wrap="square" lIns="68580" tIns="68580" rIns="68580" bIns="68580" numCol="1" spcCol="1270" anchor="ctr" anchorCtr="0">
-          <a:noAutofit/>
-        </a:bodyPr>
-        <a:lstStyle/>
-        <a:p>
-          <a:pPr lvl="0" algn="ctr" defTabSz="800100">
-            <a:lnSpc>
-              <a:spcPct val="90000"/>
-            </a:lnSpc>
-            <a:spcBef>
-              <a:spcPct val="0"/>
-            </a:spcBef>
-            <a:spcAft>
-              <a:spcPct val="35000"/>
-            </a:spcAft>
-          </a:pPr>
-          <a:r>
-            <a:rPr lang="en-US" sz="1800" kern="1200" dirty="0" smtClean="0"/>
-            <a:t>Collect the Response (often XML or JSON)</a:t>
-          </a:r>
-          <a:endParaRPr lang="en-US" sz="1800" kern="1200" dirty="0"/>
-        </a:p>
-      </dsp:txBody>
-      <dsp:txXfrm>
-        <a:off x="4511625" y="2079258"/>
-        <a:ext cx="1525225" cy="1155884"/>
-      </dsp:txXfrm>
-    </dsp:sp>
-    <dsp:sp modelId="{F5CF512E-1AD1-724E-B731-57D66E80D6A5}">
-      <dsp:nvSpPr>
-        <dsp:cNvPr id="0" name=""/>
-        <dsp:cNvSpPr/>
-      </dsp:nvSpPr>
-      <dsp:spPr>
-        <a:xfrm>
-          <a:off x="6232526" y="2459154"/>
-          <a:ext cx="338595" cy="396092"/>
-        </a:xfrm>
-        <a:prstGeom prst="rightArrow">
-          <a:avLst>
-            <a:gd name="adj1" fmla="val 60000"/>
-            <a:gd name="adj2" fmla="val 50000"/>
-          </a:avLst>
-        </a:prstGeom>
-        <a:solidFill>
-          <a:schemeClr val="accent1">
-            <a:tint val="60000"/>
-            <a:hueOff val="0"/>
-            <a:satOff val="0"/>
-            <a:lumOff val="0"/>
-            <a:alphaOff val="0"/>
-          </a:schemeClr>
-        </a:solidFill>
-        <a:ln>
-          <a:noFill/>
-        </a:ln>
-        <a:effectLst>
-          <a:outerShdw blurRad="40000" dist="20000" dir="5400000" rotWithShape="0">
-            <a:srgbClr val="000000">
-              <a:alpha val="38000"/>
-            </a:srgbClr>
-          </a:outerShdw>
-        </a:effectLst>
-      </dsp:spPr>
-      <dsp:style>
-        <a:lnRef idx="0">
-          <a:scrgbClr r="0" g="0" b="0"/>
-        </a:lnRef>
-        <a:fillRef idx="1">
-          <a:scrgbClr r="0" g="0" b="0"/>
-        </a:fillRef>
-        <a:effectRef idx="1">
-          <a:scrgbClr r="0" g="0" b="0"/>
-        </a:effectRef>
-        <a:fontRef idx="minor">
-          <a:schemeClr val="lt1"/>
-        </a:fontRef>
-      </dsp:style>
-      <dsp:txBody>
-        <a:bodyPr spcFirstLastPara="0" vert="horz" wrap="square" lIns="0" tIns="0" rIns="0" bIns="0" numCol="1" spcCol="1270" anchor="ctr" anchorCtr="0">
-          <a:noAutofit/>
-        </a:bodyPr>
-        <a:lstStyle/>
-        <a:p>
-          <a:pPr lvl="0" algn="ctr" defTabSz="622300">
-            <a:lnSpc>
-              <a:spcPct val="90000"/>
-            </a:lnSpc>
-            <a:spcBef>
-              <a:spcPct val="0"/>
-            </a:spcBef>
-            <a:spcAft>
-              <a:spcPct val="35000"/>
-            </a:spcAft>
-          </a:pPr>
-          <a:endParaRPr lang="en-US" sz="1400" kern="1200"/>
-        </a:p>
-      </dsp:txBody>
-      <dsp:txXfrm>
-        <a:off x="6232526" y="2538372"/>
-        <a:ext cx="237017" cy="237656"/>
-      </dsp:txXfrm>
-    </dsp:sp>
-    <dsp:sp modelId="{7E47C9EC-8142-0A4E-AFBC-EADB5E13AA35}">
-      <dsp:nvSpPr>
-        <dsp:cNvPr id="0" name=""/>
-        <dsp:cNvSpPr/>
-      </dsp:nvSpPr>
-      <dsp:spPr>
-        <a:xfrm>
-          <a:off x="6711670" y="2043297"/>
-          <a:ext cx="1597147" cy="1227806"/>
-        </a:xfrm>
-        <a:prstGeom prst="roundRect">
-          <a:avLst>
-            <a:gd name="adj" fmla="val 10000"/>
-          </a:avLst>
-        </a:prstGeom>
-        <a:solidFill>
-          <a:schemeClr val="accent1">
-            <a:hueOff val="0"/>
-            <a:satOff val="0"/>
-            <a:lumOff val="0"/>
-            <a:alphaOff val="0"/>
-          </a:schemeClr>
-        </a:solidFill>
-        <a:ln w="38100" cap="flat" cmpd="sng" algn="ctr">
-          <a:solidFill>
-            <a:schemeClr val="lt1">
-              <a:hueOff val="0"/>
-              <a:satOff val="0"/>
-              <a:lumOff val="0"/>
-              <a:alphaOff val="0"/>
-            </a:schemeClr>
-          </a:solidFill>
-          <a:prstDash val="solid"/>
-        </a:ln>
-        <a:effectLst>
-          <a:outerShdw blurRad="40000" dist="20000" dir="5400000" rotWithShape="0">
-            <a:srgbClr val="000000">
-              <a:alpha val="38000"/>
-            </a:srgbClr>
-          </a:outerShdw>
-        </a:effectLst>
-      </dsp:spPr>
-      <dsp:style>
-        <a:lnRef idx="3">
-          <a:scrgbClr r="0" g="0" b="0"/>
-        </a:lnRef>
-        <a:fillRef idx="1">
-          <a:scrgbClr r="0" g="0" b="0"/>
-        </a:fillRef>
-        <a:effectRef idx="1">
-          <a:scrgbClr r="0" g="0" b="0"/>
-        </a:effectRef>
-        <a:fontRef idx="minor">
-          <a:schemeClr val="lt1"/>
-        </a:fontRef>
-      </dsp:style>
-      <dsp:txBody>
-        <a:bodyPr spcFirstLastPara="0" vert="horz" wrap="square" lIns="68580" tIns="68580" rIns="68580" bIns="68580" numCol="1" spcCol="1270" anchor="ctr" anchorCtr="0">
-          <a:noAutofit/>
-        </a:bodyPr>
-        <a:lstStyle/>
-        <a:p>
-          <a:pPr lvl="0" algn="ctr" defTabSz="800100">
-            <a:lnSpc>
-              <a:spcPct val="90000"/>
-            </a:lnSpc>
-            <a:spcBef>
-              <a:spcPct val="0"/>
-            </a:spcBef>
-            <a:spcAft>
-              <a:spcPct val="35000"/>
-            </a:spcAft>
-          </a:pPr>
-          <a:r>
-            <a:rPr lang="en-US" sz="1800" kern="1200" smtClean="0"/>
-            <a:t>Parse and Act</a:t>
-          </a:r>
-          <a:endParaRPr lang="en-US" sz="1800" kern="1200" dirty="0"/>
-        </a:p>
-      </dsp:txBody>
-      <dsp:txXfrm>
-        <a:off x="6747631" y="2079258"/>
-        <a:ext cx="1525225" cy="1155884"/>
-      </dsp:txXfrm>
-    </dsp:sp>
   </dsp:spTree>
 </dsp:drawing>
 </file>
@@ -9604,7 +9040,7 @@
           <a:p>
             <a:fld id="{D3AAB66F-B1B7-D045-B4E8-4F60236F228D}" type="datetimeFigureOut">
               <a:rPr lang="en-US" smtClean="0"/>
-              <a:t>1/22/14</a:t>
+              <a:t>1/26/14</a:t>
             </a:fld>
             <a:endParaRPr lang="en-US"/>
           </a:p>
@@ -9770,7 +9206,7 @@
           <a:p>
             <a:fld id="{BCCF8E76-06A6-164E-A6FA-EC32C13EB232}" type="datetimeFigureOut">
               <a:rPr lang="en-US" smtClean="0"/>
-              <a:t>1/22/14</a:t>
+              <a:t>1/26/14</a:t>
             </a:fld>
             <a:endParaRPr lang="en-US"/>
           </a:p>
@@ -10728,7 +10164,7 @@
           <a:p>
             <a:fld id="{FD66F34B-9C4D-8640-BB34-4C24A79C9FFB}" type="slidenum">
               <a:rPr lang="en-US" smtClean="0"/>
-              <a:t>20</a:t>
+              <a:t>21</a:t>
             </a:fld>
             <a:endParaRPr lang="en-US"/>
           </a:p>
@@ -10816,7 +10252,7 @@
           <a:p>
             <a:fld id="{FD66F34B-9C4D-8640-BB34-4C24A79C9FFB}" type="slidenum">
               <a:rPr lang="en-US" smtClean="0"/>
-              <a:t>21</a:t>
+              <a:t>22</a:t>
             </a:fld>
             <a:endParaRPr lang="en-US"/>
           </a:p>
@@ -10916,7 +10352,7 @@
           <a:p>
             <a:fld id="{FD66F34B-9C4D-8640-BB34-4C24A79C9FFB}" type="slidenum">
               <a:rPr lang="en-US" smtClean="0"/>
-              <a:t>24</a:t>
+              <a:t>25</a:t>
             </a:fld>
             <a:endParaRPr lang="en-US"/>
           </a:p>
@@ -11000,7 +10436,7 @@
           <a:p>
             <a:fld id="{FD66F34B-9C4D-8640-BB34-4C24A79C9FFB}" type="slidenum">
               <a:rPr lang="en-US" smtClean="0"/>
-              <a:t>26</a:t>
+              <a:t>27</a:t>
             </a:fld>
             <a:endParaRPr lang="en-US"/>
           </a:p>
@@ -11084,7 +10520,7 @@
           <a:p>
             <a:fld id="{FD66F34B-9C4D-8640-BB34-4C24A79C9FFB}" type="slidenum">
               <a:rPr lang="en-US" smtClean="0"/>
-              <a:t>27</a:t>
+              <a:t>28</a:t>
             </a:fld>
             <a:endParaRPr lang="en-US"/>
           </a:p>
@@ -11284,7 +10720,7 @@
           <a:p>
             <a:fld id="{FD66F34B-9C4D-8640-BB34-4C24A79C9FFB}" type="slidenum">
               <a:rPr lang="en-US" smtClean="0"/>
-              <a:t>28</a:t>
+              <a:t>29</a:t>
             </a:fld>
             <a:endParaRPr lang="en-US"/>
           </a:p>
@@ -11368,7 +10804,7 @@
           <a:p>
             <a:fld id="{FD66F34B-9C4D-8640-BB34-4C24A79C9FFB}" type="slidenum">
               <a:rPr lang="en-US" smtClean="0"/>
-              <a:t>29</a:t>
+              <a:t>30</a:t>
             </a:fld>
             <a:endParaRPr lang="en-US"/>
           </a:p>
@@ -11452,7 +10888,7 @@
           <a:p>
             <a:fld id="{FD66F34B-9C4D-8640-BB34-4C24A79C9FFB}" type="slidenum">
               <a:rPr lang="en-US" smtClean="0"/>
-              <a:t>30</a:t>
+              <a:t>31</a:t>
             </a:fld>
             <a:endParaRPr lang="en-US"/>
           </a:p>
@@ -11536,7 +10972,7 @@
           <a:p>
             <a:fld id="{FD66F34B-9C4D-8640-BB34-4C24A79C9FFB}" type="slidenum">
               <a:rPr lang="en-US" smtClean="0"/>
-              <a:t>31</a:t>
+              <a:t>32</a:t>
             </a:fld>
             <a:endParaRPr lang="en-US"/>
           </a:p>
@@ -11620,7 +11056,7 @@
           <a:p>
             <a:fld id="{FD66F34B-9C4D-8640-BB34-4C24A79C9FFB}" type="slidenum">
               <a:rPr lang="en-US" smtClean="0"/>
-              <a:t>32</a:t>
+              <a:t>33</a:t>
             </a:fld>
             <a:endParaRPr lang="en-US"/>
           </a:p>
@@ -11704,7 +11140,7 @@
           <a:p>
             <a:fld id="{FD66F34B-9C4D-8640-BB34-4C24A79C9FFB}" type="slidenum">
               <a:rPr lang="en-US" smtClean="0"/>
-              <a:t>34</a:t>
+              <a:t>35</a:t>
             </a:fld>
             <a:endParaRPr lang="en-US"/>
           </a:p>
@@ -11788,7 +11224,7 @@
           <a:p>
             <a:fld id="{FD66F34B-9C4D-8640-BB34-4C24A79C9FFB}" type="slidenum">
               <a:rPr lang="en-US" smtClean="0"/>
-              <a:t>35</a:t>
+              <a:t>36</a:t>
             </a:fld>
             <a:endParaRPr lang="en-US"/>
           </a:p>
@@ -11876,7 +11312,7 @@
           <a:p>
             <a:fld id="{FD66F34B-9C4D-8640-BB34-4C24A79C9FFB}" type="slidenum">
               <a:rPr lang="en-US" smtClean="0"/>
-              <a:t>36</a:t>
+              <a:t>37</a:t>
             </a:fld>
             <a:endParaRPr lang="en-US"/>
           </a:p>
@@ -11980,7 +11416,7 @@
           <a:p>
             <a:fld id="{FD66F34B-9C4D-8640-BB34-4C24A79C9FFB}" type="slidenum">
               <a:rPr lang="en-US" smtClean="0"/>
-              <a:t>37</a:t>
+              <a:t>38</a:t>
             </a:fld>
             <a:endParaRPr lang="en-US"/>
           </a:p>
@@ -13210,7 +12646,7 @@
             <a:fld id="{FA3C144B-2939-9A49-B014-915EC3E81866}" type="datetime1">
               <a:rPr lang="en-US" smtClean="0"/>
               <a:pPr/>
-              <a:t>1/22/14</a:t>
+              <a:t>1/26/14</a:t>
             </a:fld>
             <a:endParaRPr lang="en-US" dirty="0"/>
           </a:p>
@@ -13639,7 +13075,7 @@
           <a:p>
             <a:fld id="{76838339-A875-5E45-AB3F-AAABD270346A}" type="datetime1">
               <a:rPr lang="en-US" smtClean="0"/>
-              <a:t>1/22/14</a:t>
+              <a:t>1/26/14</a:t>
             </a:fld>
             <a:endParaRPr lang="en-US"/>
           </a:p>
@@ -13925,7 +13361,7 @@
             <a:fld id="{FA3C144B-2939-9A49-B014-915EC3E81866}" type="datetime1">
               <a:rPr lang="en-US" smtClean="0"/>
               <a:pPr/>
-              <a:t>1/22/14</a:t>
+              <a:t>1/26/14</a:t>
             </a:fld>
             <a:endParaRPr lang="en-US" dirty="0"/>
           </a:p>
@@ -14407,7 +13843,7 @@
           <a:p>
             <a:fld id="{A73F672F-A5FB-5745-934A-1BF51CA5539C}" type="datetime1">
               <a:rPr lang="en-US" smtClean="0"/>
-              <a:t>1/22/14</a:t>
+              <a:t>1/26/14</a:t>
             </a:fld>
             <a:endParaRPr lang="en-US"/>
           </a:p>
@@ -14749,7 +14185,7 @@
             <a:fld id="{FA3C144B-2939-9A49-B014-915EC3E81866}" type="datetime1">
               <a:rPr lang="en-US" smtClean="0"/>
               <a:pPr/>
-              <a:t>1/22/14</a:t>
+              <a:t>1/26/14</a:t>
             </a:fld>
             <a:endParaRPr lang="en-US" dirty="0"/>
           </a:p>
@@ -15213,7 +14649,7 @@
           <a:p>
             <a:fld id="{6AFE6A63-5EBE-3E48-B0AE-DF655A1ECE76}" type="datetime1">
               <a:rPr lang="en-US" smtClean="0"/>
-              <a:t>1/22/14</a:t>
+              <a:t>1/26/14</a:t>
             </a:fld>
             <a:endParaRPr lang="en-US"/>
           </a:p>
@@ -15532,7 +14968,7 @@
           <a:p>
             <a:fld id="{4A019F0C-9D18-B54A-9AC9-18AA74EDB034}" type="datetime1">
               <a:rPr lang="en-US" smtClean="0"/>
-              <a:t>1/22/14</a:t>
+              <a:t>1/26/14</a:t>
             </a:fld>
             <a:endParaRPr lang="en-US"/>
           </a:p>
@@ -15842,7 +15278,7 @@
             <a:fld id="{FA3C144B-2939-9A49-B014-915EC3E81866}" type="datetime1">
               <a:rPr lang="en-US" smtClean="0"/>
               <a:pPr/>
-              <a:t>1/22/14</a:t>
+              <a:t>1/26/14</a:t>
             </a:fld>
             <a:endParaRPr lang="en-US" dirty="0"/>
           </a:p>
@@ -16105,7 +15541,7 @@
           <a:p>
             <a:fld id="{FA3C144B-2939-9A49-B014-915EC3E81866}" type="datetime1">
               <a:rPr lang="en-US" smtClean="0"/>
-              <a:t>1/22/14</a:t>
+              <a:t>1/26/14</a:t>
             </a:fld>
             <a:endParaRPr lang="en-US" dirty="0"/>
           </a:p>
@@ -16367,7 +15803,7 @@
           <a:p>
             <a:fld id="{31ABE473-7551-0F4A-ACC5-906E2044C6C8}" type="datetimeFigureOut">
               <a:rPr lang="en-US" smtClean="0"/>
-              <a:t>1/22/14</a:t>
+              <a:t>1/26/14</a:t>
             </a:fld>
             <a:endParaRPr lang="en-US"/>
           </a:p>
@@ -16568,7 +16004,7 @@
           <a:p>
             <a:fld id="{7053BEFA-1175-F644-B249-7D41D72BD3FF}" type="datetime1">
               <a:rPr lang="en-US" smtClean="0"/>
-              <a:t>1/22/14</a:t>
+              <a:t>1/26/14</a:t>
             </a:fld>
             <a:endParaRPr lang="en-US"/>
           </a:p>
@@ -16687,7 +16123,7 @@
             <a:fld id="{FA3C144B-2939-9A49-B014-915EC3E81866}" type="datetime1">
               <a:rPr lang="en-US" smtClean="0"/>
               <a:pPr/>
-              <a:t>1/22/14</a:t>
+              <a:t>1/26/14</a:t>
             </a:fld>
             <a:endParaRPr lang="en-US" dirty="0"/>
           </a:p>
@@ -16904,7 +16340,7 @@
             <a:fld id="{FA3C144B-2939-9A49-B014-915EC3E81866}" type="datetime1">
               <a:rPr lang="en-US" smtClean="0"/>
               <a:pPr/>
-              <a:t>1/22/14</a:t>
+              <a:t>1/26/14</a:t>
             </a:fld>
             <a:endParaRPr lang="en-US" dirty="0"/>
           </a:p>
@@ -17149,7 +16585,7 @@
             <a:fld id="{FA3C144B-2939-9A49-B014-915EC3E81866}" type="datetime1">
               <a:rPr lang="en-US" smtClean="0"/>
               <a:pPr/>
-              <a:t>1/22/14</a:t>
+              <a:t>1/26/14</a:t>
             </a:fld>
             <a:endParaRPr lang="en-US" dirty="0"/>
           </a:p>
@@ -17527,7 +16963,7 @@
           <a:p>
             <a:fld id="{111EEF3B-ABF2-AA4E-9E24-0C6256942674}" type="datetime1">
               <a:rPr lang="en-US" smtClean="0"/>
-              <a:t>1/22/14</a:t>
+              <a:t>1/26/14</a:t>
             </a:fld>
             <a:endParaRPr lang="en-US"/>
           </a:p>
@@ -17691,7 +17127,7 @@
             <a:fld id="{FA3C144B-2939-9A49-B014-915EC3E81866}" type="datetime1">
               <a:rPr lang="en-US" smtClean="0"/>
               <a:pPr/>
-              <a:t>1/22/14</a:t>
+              <a:t>1/26/14</a:t>
             </a:fld>
             <a:endParaRPr lang="en-US" dirty="0"/>
           </a:p>
@@ -18108,7 +17544,7 @@
             <a:fld id="{FA3C144B-2939-9A49-B014-915EC3E81866}" type="datetime1">
               <a:rPr lang="en-US" smtClean="0"/>
               <a:pPr/>
-              <a:t>1/22/14</a:t>
+              <a:t>1/26/14</a:t>
             </a:fld>
             <a:endParaRPr lang="en-US" dirty="0"/>
           </a:p>
@@ -18424,7 +17860,7 @@
             <a:fld id="{FA3C144B-2939-9A49-B014-915EC3E81866}" type="datetime1">
               <a:rPr lang="en-US" smtClean="0"/>
               <a:pPr/>
-              <a:t>1/22/14</a:t>
+              <a:t>1/26/14</a:t>
             </a:fld>
             <a:endParaRPr lang="en-US" dirty="0"/>
           </a:p>
@@ -19090,7 +18526,7 @@
             <a:fld id="{FA3C144B-2939-9A49-B014-915EC3E81866}" type="datetime1">
               <a:rPr lang="en-US" smtClean="0"/>
               <a:pPr/>
-              <a:t>1/22/14</a:t>
+              <a:t>1/26/14</a:t>
             </a:fld>
             <a:endParaRPr lang="en-US" dirty="0"/>
           </a:p>
@@ -20560,7 +19996,7 @@
           <a:p>
             <a:fld id="{7053BEFA-1175-F644-B249-7D41D72BD3FF}" type="datetime1">
               <a:rPr lang="en-US" smtClean="0"/>
-              <a:t>1/22/14</a:t>
+              <a:t>1/26/14</a:t>
             </a:fld>
             <a:endParaRPr lang="en-US"/>
           </a:p>
@@ -21424,7 +20860,7 @@
           <a:p>
             <a:fld id="{111EEF3B-ABF2-AA4E-9E24-0C6256942674}" type="datetime1">
               <a:rPr lang="en-US" smtClean="0"/>
-              <a:t>1/22/14</a:t>
+              <a:t>1/26/14</a:t>
             </a:fld>
             <a:endParaRPr lang="en-US"/>
           </a:p>
@@ -22650,33 +22086,11 @@
             </a:r>
             <a:r>
               <a:rPr lang="en-US" dirty="0"/>
-              <a:t>in the population</a:t>
-            </a:r>
-          </a:p>
-          <a:p>
-            <a:pPr marL="0" indent="0">
-              <a:buNone/>
-            </a:pPr>
+              <a:t>in the </a:t>
+            </a:r>
             <a:r>
               <a:rPr lang="en-US" dirty="0" smtClean="0"/>
-              <a:t>Address when you </a:t>
-            </a:r>
-            <a:r>
-              <a:rPr lang="en-US" i="1" dirty="0" smtClean="0"/>
-              <a:t>plan </a:t>
-            </a:r>
-            <a:r>
-              <a:rPr lang="en-US" dirty="0" smtClean="0"/>
-              <a:t>your sample</a:t>
-            </a:r>
-          </a:p>
-          <a:p>
-            <a:pPr marL="0" indent="0">
-              <a:buNone/>
-            </a:pPr>
-            <a:r>
-              <a:rPr lang="en-US" dirty="0" smtClean="0"/>
-              <a:t>Measure so you know what you have</a:t>
+              <a:t>population</a:t>
             </a:r>
             <a:endParaRPr lang="en-US" dirty="0"/>
           </a:p>
@@ -22699,7 +22113,7 @@
           <a:p>
             <a:fld id="{7053BEFA-1175-F644-B249-7D41D72BD3FF}" type="datetime1">
               <a:rPr lang="en-US" smtClean="0"/>
-              <a:t>1/22/14</a:t>
+              <a:t>1/26/14</a:t>
             </a:fld>
             <a:endParaRPr lang="en-US"/>
           </a:p>
@@ -22801,7 +22215,7 @@
           <a:p>
             <a:r>
               <a:rPr lang="en-US" dirty="0" smtClean="0"/>
-              <a:t>How does data collection affect the sample?</a:t>
+              <a:t>Bias</a:t>
             </a:r>
             <a:endParaRPr lang="en-US" dirty="0"/>
           </a:p>
@@ -22826,43 +22240,23 @@
               <a:buNone/>
             </a:pPr>
             <a:r>
-              <a:rPr lang="en-US" dirty="0" smtClean="0"/>
-              <a:t>We surveyed people in online mailing lists &amp; used ‘snowball’ sampling</a:t>
+              <a:rPr lang="en-US" dirty="0"/>
+              <a:t>Address when you </a:t>
+            </a:r>
+            <a:r>
+              <a:rPr lang="en-US" i="1" dirty="0"/>
+              <a:t>plan </a:t>
+            </a:r>
+            <a:r>
+              <a:rPr lang="en-US" dirty="0"/>
+              <a:t>your sample</a:t>
             </a:r>
           </a:p>
           <a:p>
             <a:pPr marL="0" indent="0">
               <a:buNone/>
             </a:pPr>
-            <a:r>
-              <a:rPr lang="en-US" dirty="0" smtClean="0"/>
-              <a:t>Other options?</a:t>
-            </a:r>
-          </a:p>
-          <a:p>
-            <a:pPr lvl="1"/>
-            <a:r>
-              <a:rPr lang="en-US" dirty="0" smtClean="0"/>
-              <a:t>Randomly call phone numbers in different regions</a:t>
-            </a:r>
-          </a:p>
-          <a:p>
-            <a:pPr lvl="1"/>
-            <a:r>
-              <a:rPr lang="en-US" dirty="0" smtClean="0"/>
-              <a:t>Hang out in doctors’ offices</a:t>
-            </a:r>
-          </a:p>
-          <a:p>
-            <a:pPr lvl="1"/>
-            <a:r>
-              <a:rPr lang="en-US" dirty="0" smtClean="0"/>
-              <a:t>Advertise on buses and billboards</a:t>
-            </a:r>
-          </a:p>
-          <a:p>
-            <a:pPr lvl="1"/>
-            <a:endParaRPr lang="en-US" dirty="0" smtClean="0"/>
+            <a:endParaRPr lang="en-US" dirty="0"/>
           </a:p>
         </p:txBody>
       </p:sp>
@@ -22883,7 +22277,7 @@
           <a:p>
             <a:fld id="{7053BEFA-1175-F644-B249-7D41D72BD3FF}" type="datetime1">
               <a:rPr lang="en-US" smtClean="0"/>
-              <a:t>1/22/14</a:t>
+              <a:t>1/26/14</a:t>
             </a:fld>
             <a:endParaRPr lang="en-US"/>
           </a:p>
@@ -22934,20 +22328,13 @@
     </p:spTree>
     <p:extLst>
       <p:ext uri="{BB962C8B-B14F-4D97-AF65-F5344CB8AC3E}">
-        <p14:creationId xmlns:p14="http://schemas.microsoft.com/office/powerpoint/2010/main" val="1732393437"/>
+        <p14:creationId xmlns:p14="http://schemas.microsoft.com/office/powerpoint/2010/main" val="2300799934"/>
       </p:ext>
     </p:extLst>
   </p:cSld>
   <p:clrMapOvr>
     <a:masterClrMapping/>
   </p:clrMapOvr>
-  <p:timing>
-    <p:tnLst>
-      <p:par>
-        <p:cTn xmlns:p14="http://schemas.microsoft.com/office/powerpoint/2010/main" id="1" dur="indefinite" restart="never" nodeType="tmRoot"/>
-      </p:par>
-    </p:tnLst>
-  </p:timing>
 </p:sld>
 </file>
 
@@ -22985,7 +22372,7 @@
           <a:p>
             <a:r>
               <a:rPr lang="en-US" dirty="0" smtClean="0"/>
-              <a:t>What if you are not doing a survey?</a:t>
+              <a:t>How does data collection affect the sample?</a:t>
             </a:r>
             <a:endParaRPr lang="en-US" dirty="0"/>
           </a:p>
@@ -23011,27 +22398,7 @@
             </a:pPr>
             <a:r>
               <a:rPr lang="en-US" dirty="0" smtClean="0"/>
-              <a:t>Personal data can piggyback on existing devices (</a:t>
-            </a:r>
-            <a:r>
-              <a:rPr lang="en-US" i="1" dirty="0" smtClean="0"/>
-              <a:t>e.g., </a:t>
-            </a:r>
-            <a:r>
-              <a:rPr lang="en-US" dirty="0"/>
-              <a:t>Make an android app people want to use (</a:t>
-            </a:r>
-            <a:r>
-              <a:rPr lang="en-US" i="1" dirty="0"/>
-              <a:t>e.g. </a:t>
-            </a:r>
-            <a:r>
-              <a:rPr lang="en-US" dirty="0"/>
-              <a:t>battery alerts) and give it free in return for </a:t>
-            </a:r>
-            <a:r>
-              <a:rPr lang="en-US" dirty="0" smtClean="0"/>
-              <a:t>data)</a:t>
+              <a:t>We surveyed people in online mailing lists &amp; used ‘snowball’ sampling</a:t>
             </a:r>
           </a:p>
           <a:p>
@@ -23040,19 +22407,32 @@
             </a:pPr>
             <a:r>
               <a:rPr lang="en-US" dirty="0" smtClean="0"/>
-              <a:t>Public data can too (satellite data for example; or our current work with the Gates building)</a:t>
-            </a:r>
-          </a:p>
-          <a:p>
-            <a:pPr marL="0" indent="0">
-              <a:buNone/>
-            </a:pPr>
-            <a:endParaRPr lang="en-US" dirty="0"/>
-          </a:p>
-          <a:p>
-            <a:pPr marL="0" indent="0">
-              <a:buNone/>
-            </a:pPr>
+              <a:t>Other options?</a:t>
+            </a:r>
+          </a:p>
+          <a:p>
+            <a:pPr lvl="1"/>
+            <a:r>
+              <a:rPr lang="en-US" dirty="0" smtClean="0"/>
+              <a:t>Randomly call phone numbers in different regions</a:t>
+            </a:r>
+          </a:p>
+          <a:p>
+            <a:pPr lvl="1"/>
+            <a:r>
+              <a:rPr lang="en-US" dirty="0" smtClean="0"/>
+              <a:t>Hang out in doctors’ offices</a:t>
+            </a:r>
+          </a:p>
+          <a:p>
+            <a:pPr lvl="1"/>
+            <a:r>
+              <a:rPr lang="en-US" dirty="0" smtClean="0"/>
+              <a:t>Advertise on buses and billboards</a:t>
+            </a:r>
+          </a:p>
+          <a:p>
+            <a:pPr lvl="1"/>
             <a:endParaRPr lang="en-US" dirty="0" smtClean="0"/>
           </a:p>
         </p:txBody>
@@ -23074,7 +22454,7 @@
           <a:p>
             <a:fld id="{7053BEFA-1175-F644-B249-7D41D72BD3FF}" type="datetime1">
               <a:rPr lang="en-US" smtClean="0"/>
-              <a:t>1/22/14</a:t>
+              <a:t>1/26/14</a:t>
             </a:fld>
             <a:endParaRPr lang="en-US"/>
           </a:p>
@@ -23125,7 +22505,7 @@
     </p:spTree>
     <p:extLst>
       <p:ext uri="{BB962C8B-B14F-4D97-AF65-F5344CB8AC3E}">
-        <p14:creationId xmlns:p14="http://schemas.microsoft.com/office/powerpoint/2010/main" val="3391453722"/>
+        <p14:creationId xmlns:p14="http://schemas.microsoft.com/office/powerpoint/2010/main" val="1732393437"/>
       </p:ext>
     </p:extLst>
   </p:cSld>
@@ -23218,7 +22598,7 @@
           <a:p>
             <a:fld id="{111EEF3B-ABF2-AA4E-9E24-0C6256942674}" type="datetime1">
               <a:rPr lang="en-US" smtClean="0"/>
-              <a:t>1/22/14</a:t>
+              <a:t>1/26/14</a:t>
             </a:fld>
             <a:endParaRPr lang="en-US"/>
           </a:p>
@@ -23327,54 +22707,26 @@
             </a:pPr>
             <a:r>
               <a:rPr lang="en-US" dirty="0" smtClean="0"/>
-              <a:t>Personal data can piggyback on existing devices </a:t>
-            </a:r>
-            <a:r>
-              <a:rPr lang="en-US" b="1" dirty="0" smtClean="0">
-                <a:solidFill>
-                  <a:schemeClr val="accent1"/>
-                </a:solidFill>
-              </a:rPr>
-              <a:t>(</a:t>
-            </a:r>
-            <a:r>
-              <a:rPr lang="en-US" b="1" i="1" dirty="0" smtClean="0">
-                <a:solidFill>
-                  <a:schemeClr val="accent1"/>
-                </a:solidFill>
-              </a:rPr>
+              <a:t>Personal data can piggyback on existing devices (</a:t>
+            </a:r>
+            <a:r>
+              <a:rPr lang="en-US" i="1" dirty="0" smtClean="0"/>
               <a:t>e.g., </a:t>
             </a:r>
             <a:r>
-              <a:rPr lang="en-US" b="1" dirty="0">
-                <a:solidFill>
-                  <a:schemeClr val="accent1"/>
-                </a:solidFill>
-              </a:rPr>
+              <a:rPr lang="en-US" dirty="0"/>
               <a:t>Make an android app people want to use (</a:t>
             </a:r>
             <a:r>
-              <a:rPr lang="en-US" b="1" i="1" dirty="0">
-                <a:solidFill>
-                  <a:schemeClr val="accent1"/>
-                </a:solidFill>
-              </a:rPr>
+              <a:rPr lang="en-US" i="1" dirty="0"/>
               <a:t>e.g. </a:t>
             </a:r>
             <a:r>
-              <a:rPr lang="en-US" b="1" dirty="0">
-                <a:solidFill>
-                  <a:schemeClr val="accent1"/>
-                </a:solidFill>
-              </a:rPr>
+              <a:rPr lang="en-US" dirty="0"/>
               <a:t>battery alerts) and give it free in return for </a:t>
             </a:r>
             <a:r>
-              <a:rPr lang="en-US" b="1" dirty="0" smtClean="0">
-                <a:solidFill>
-                  <a:schemeClr val="accent1"/>
-                </a:solidFill>
-              </a:rPr>
+              <a:rPr lang="en-US" dirty="0" smtClean="0"/>
               <a:t>data)</a:t>
             </a:r>
           </a:p>
@@ -23418,7 +22770,7 @@
           <a:p>
             <a:fld id="{7053BEFA-1175-F644-B249-7D41D72BD3FF}" type="datetime1">
               <a:rPr lang="en-US" smtClean="0"/>
-              <a:t>1/22/14</a:t>
+              <a:t>1/26/14</a:t>
             </a:fld>
             <a:endParaRPr lang="en-US"/>
           </a:p>
@@ -23469,7 +22821,7 @@
     </p:spTree>
     <p:extLst>
       <p:ext uri="{BB962C8B-B14F-4D97-AF65-F5344CB8AC3E}">
-        <p14:creationId xmlns:p14="http://schemas.microsoft.com/office/powerpoint/2010/main" val="3131266341"/>
+        <p14:creationId xmlns:p14="http://schemas.microsoft.com/office/powerpoint/2010/main" val="3391453722"/>
       </p:ext>
     </p:extLst>
   </p:cSld>
@@ -23546,36 +22898,7 @@
             </a:pPr>
             <a:r>
               <a:rPr lang="en-US" dirty="0" smtClean="0"/>
-              <a:t>Personal data can piggyback on existing devices (</a:t>
-            </a:r>
-            <a:r>
-              <a:rPr lang="en-US" i="1" dirty="0" smtClean="0"/>
-              <a:t>e.g., </a:t>
-            </a:r>
-            <a:r>
-              <a:rPr lang="en-US" dirty="0"/>
-              <a:t>Make an android app people want to use (</a:t>
-            </a:r>
-            <a:r>
-              <a:rPr lang="en-US" i="1" dirty="0"/>
-              <a:t>e.g. </a:t>
-            </a:r>
-            <a:r>
-              <a:rPr lang="en-US" dirty="0"/>
-              <a:t>battery alerts) and give it free in return for </a:t>
-            </a:r>
-            <a:r>
-              <a:rPr lang="en-US" dirty="0" smtClean="0"/>
-              <a:t>data)</a:t>
-            </a:r>
-          </a:p>
-          <a:p>
-            <a:pPr marL="0" indent="0">
-              <a:buNone/>
-            </a:pPr>
-            <a:r>
-              <a:rPr lang="en-US" dirty="0" smtClean="0"/>
-              <a:t>Public data can too (satellite data for example; or </a:t>
+              <a:t>Personal data can piggyback on existing devices </a:t>
             </a:r>
             <a:r>
               <a:rPr lang="en-US" b="1" dirty="0" smtClean="0">
@@ -23583,7 +22906,56 @@
                   <a:schemeClr val="accent1"/>
                 </a:solidFill>
               </a:rPr>
-              <a:t>our current work with the Gates building)</a:t>
+              <a:t>(</a:t>
+            </a:r>
+            <a:r>
+              <a:rPr lang="en-US" b="1" i="1" dirty="0" smtClean="0">
+                <a:solidFill>
+                  <a:schemeClr val="accent1"/>
+                </a:solidFill>
+              </a:rPr>
+              <a:t>e.g., </a:t>
+            </a:r>
+            <a:r>
+              <a:rPr lang="en-US" b="1" dirty="0">
+                <a:solidFill>
+                  <a:schemeClr val="accent1"/>
+                </a:solidFill>
+              </a:rPr>
+              <a:t>Make an android app people want to use (</a:t>
+            </a:r>
+            <a:r>
+              <a:rPr lang="en-US" b="1" i="1" dirty="0">
+                <a:solidFill>
+                  <a:schemeClr val="accent1"/>
+                </a:solidFill>
+              </a:rPr>
+              <a:t>e.g. </a:t>
+            </a:r>
+            <a:r>
+              <a:rPr lang="en-US" b="1" dirty="0">
+                <a:solidFill>
+                  <a:schemeClr val="accent1"/>
+                </a:solidFill>
+              </a:rPr>
+              <a:t>battery alerts) and give it free in return for </a:t>
+            </a:r>
+            <a:r>
+              <a:rPr lang="en-US" b="1" dirty="0" smtClean="0">
+                <a:solidFill>
+                  <a:schemeClr val="accent1"/>
+                </a:solidFill>
+              </a:rPr>
+              <a:t>data)</a:t>
+            </a:r>
+          </a:p>
+          <a:p>
+            <a:pPr marL="0" indent="0">
+              <a:buNone/>
+            </a:pPr>
+            <a:r>
+              <a:rPr lang="en-US" dirty="0" smtClean="0"/>
+              <a:t>Public data can too (satellite data for example; or our current work with the Gates building)</a:t>
             </a:r>
           </a:p>
           <a:p>
@@ -23617,7 +22989,7 @@
           <a:p>
             <a:fld id="{7053BEFA-1175-F644-B249-7D41D72BD3FF}" type="datetime1">
               <a:rPr lang="en-US" smtClean="0"/>
-              <a:t>1/22/14</a:t>
+              <a:t>1/26/14</a:t>
             </a:fld>
             <a:endParaRPr lang="en-US"/>
           </a:p>
@@ -23668,7 +23040,7 @@
     </p:spTree>
     <p:extLst>
       <p:ext uri="{BB962C8B-B14F-4D97-AF65-F5344CB8AC3E}">
-        <p14:creationId xmlns:p14="http://schemas.microsoft.com/office/powerpoint/2010/main" val="2465198812"/>
+        <p14:creationId xmlns:p14="http://schemas.microsoft.com/office/powerpoint/2010/main" val="3131266341"/>
       </p:ext>
     </p:extLst>
   </p:cSld>
@@ -23719,7 +23091,7 @@
           <a:p>
             <a:r>
               <a:rPr lang="en-US" dirty="0" smtClean="0"/>
-              <a:t>Practice: Getting at data</a:t>
+              <a:t>What if you are not doing a survey?</a:t>
             </a:r>
             <a:endParaRPr lang="en-US" dirty="0"/>
           </a:p>
@@ -23727,12 +23099,12 @@
       </p:sp>
       <p:sp>
         <p:nvSpPr>
-          <p:cNvPr id="3" name="Text Placeholder 2"/>
+          <p:cNvPr id="3" name="Content Placeholder 2"/>
           <p:cNvSpPr>
             <a:spLocks noGrp="1"/>
           </p:cNvSpPr>
           <p:nvPr>
-            <p:ph type="body" idx="1"/>
+            <p:ph idx="1"/>
           </p:nvPr>
         </p:nvSpPr>
         <p:spPr/>
@@ -23740,7 +23112,62 @@
           <a:bodyPr/>
           <a:lstStyle/>
           <a:p>
-            <a:endParaRPr lang="en-US"/>
+            <a:pPr marL="0" indent="0">
+              <a:buNone/>
+            </a:pPr>
+            <a:r>
+              <a:rPr lang="en-US" dirty="0" smtClean="0"/>
+              <a:t>Personal data can piggyback on existing devices (</a:t>
+            </a:r>
+            <a:r>
+              <a:rPr lang="en-US" i="1" dirty="0" smtClean="0"/>
+              <a:t>e.g., </a:t>
+            </a:r>
+            <a:r>
+              <a:rPr lang="en-US" dirty="0"/>
+              <a:t>Make an android app people want to use (</a:t>
+            </a:r>
+            <a:r>
+              <a:rPr lang="en-US" i="1" dirty="0"/>
+              <a:t>e.g. </a:t>
+            </a:r>
+            <a:r>
+              <a:rPr lang="en-US" dirty="0"/>
+              <a:t>battery alerts) and give it free in return for </a:t>
+            </a:r>
+            <a:r>
+              <a:rPr lang="en-US" dirty="0" smtClean="0"/>
+              <a:t>data)</a:t>
+            </a:r>
+          </a:p>
+          <a:p>
+            <a:pPr marL="0" indent="0">
+              <a:buNone/>
+            </a:pPr>
+            <a:r>
+              <a:rPr lang="en-US" dirty="0" smtClean="0"/>
+              <a:t>Public data can too (satellite data for example; or </a:t>
+            </a:r>
+            <a:r>
+              <a:rPr lang="en-US" b="1" dirty="0" smtClean="0">
+                <a:solidFill>
+                  <a:schemeClr val="accent1"/>
+                </a:solidFill>
+              </a:rPr>
+              <a:t>our current work with the Gates building)</a:t>
+            </a:r>
+          </a:p>
+          <a:p>
+            <a:pPr marL="0" indent="0">
+              <a:buNone/>
+            </a:pPr>
+            <a:endParaRPr lang="en-US" dirty="0"/>
+          </a:p>
+          <a:p>
+            <a:pPr marL="0" indent="0">
+              <a:buNone/>
+            </a:pPr>
+            <a:endParaRPr lang="en-US" dirty="0" smtClean="0"/>
           </a:p>
         </p:txBody>
       </p:sp>
@@ -23759,9 +23186,9 @@
           <a:bodyPr/>
           <a:lstStyle/>
           <a:p>
-            <a:fld id="{111EEF3B-ABF2-AA4E-9E24-0C6256942674}" type="datetime1">
+            <a:fld id="{7053BEFA-1175-F644-B249-7D41D72BD3FF}" type="datetime1">
               <a:rPr lang="en-US" smtClean="0"/>
-              <a:t>1/22/14</a:t>
+              <a:t>1/26/14</a:t>
             </a:fld>
             <a:endParaRPr lang="en-US"/>
           </a:p>
@@ -23769,7 +23196,26 @@
       </p:sp>
       <p:sp>
         <p:nvSpPr>
-          <p:cNvPr id="5" name="Slide Number Placeholder 4"/>
+          <p:cNvPr id="5" name="Footer Placeholder 4"/>
+          <p:cNvSpPr>
+            <a:spLocks noGrp="1"/>
+          </p:cNvSpPr>
+          <p:nvPr>
+            <p:ph type="ftr" sz="quarter" idx="11"/>
+          </p:nvPr>
+        </p:nvSpPr>
+        <p:spPr/>
+        <p:txBody>
+          <a:bodyPr/>
+          <a:lstStyle/>
+          <a:p>
+            <a:endParaRPr lang="en-US" dirty="0"/>
+          </a:p>
+        </p:txBody>
+      </p:sp>
+      <p:sp>
+        <p:nvSpPr>
+          <p:cNvPr id="6" name="Slide Number Placeholder 5"/>
           <p:cNvSpPr>
             <a:spLocks noGrp="1"/>
           </p:cNvSpPr>
@@ -23793,7 +23239,7 @@
     </p:spTree>
     <p:extLst>
       <p:ext uri="{BB962C8B-B14F-4D97-AF65-F5344CB8AC3E}">
-        <p14:creationId xmlns:p14="http://schemas.microsoft.com/office/powerpoint/2010/main" val="992993271"/>
+        <p14:creationId xmlns:p14="http://schemas.microsoft.com/office/powerpoint/2010/main" val="2465198812"/>
       </p:ext>
     </p:extLst>
   </p:cSld>
@@ -23844,7 +23290,7 @@
           <a:p>
             <a:r>
               <a:rPr lang="en-US" dirty="0" smtClean="0"/>
-              <a:t>Lots of ‘existing’ data</a:t>
+              <a:t>Practice: Getting at data</a:t>
             </a:r>
             <a:endParaRPr lang="en-US" dirty="0"/>
           </a:p>
@@ -23852,12 +23298,12 @@
       </p:sp>
       <p:sp>
         <p:nvSpPr>
-          <p:cNvPr id="3" name="Content Placeholder 2"/>
+          <p:cNvPr id="3" name="Text Placeholder 2"/>
           <p:cNvSpPr>
             <a:spLocks noGrp="1"/>
           </p:cNvSpPr>
           <p:nvPr>
-            <p:ph idx="1"/>
+            <p:ph type="body" idx="1"/>
           </p:nvPr>
         </p:nvSpPr>
         <p:spPr/>
@@ -23865,46 +23311,7 @@
           <a:bodyPr/>
           <a:lstStyle/>
           <a:p>
-            <a:pPr marL="0" indent="0">
-              <a:buNone/>
-            </a:pPr>
-            <a:r>
-              <a:rPr lang="en-US" dirty="0" smtClean="0">
-                <a:hlinkClick r:id="rId2"/>
-              </a:rPr>
-              <a:t>http</a:t>
-            </a:r>
-            <a:r>
-              <a:rPr lang="en-US" dirty="0">
-                <a:hlinkClick r:id="rId2"/>
-              </a:rPr>
-              <a:t>://</a:t>
-            </a:r>
-            <a:r>
-              <a:rPr lang="en-US" dirty="0" err="1">
-                <a:hlinkClick r:id="rId2"/>
-              </a:rPr>
-              <a:t>data.cmubi.org</a:t>
-            </a:r>
-            <a:r>
-              <a:rPr lang="en-US" dirty="0">
-                <a:hlinkClick r:id="rId2"/>
-              </a:rPr>
-              <a:t>/classroom-news/</a:t>
-            </a:r>
-            <a:r>
-              <a:rPr lang="en-US" dirty="0" err="1" smtClean="0">
-                <a:hlinkClick r:id="rId2"/>
-              </a:rPr>
-              <a:t>somegreatsourcesofdata</a:t>
-            </a:r>
-            <a:endParaRPr lang="en-US" dirty="0" smtClean="0"/>
-          </a:p>
-          <a:p>
-            <a:pPr marL="0" indent="0">
-              <a:buNone/>
-            </a:pPr>
-            <a:endParaRPr lang="en-US" dirty="0" smtClean="0"/>
+            <a:endParaRPr lang="en-US"/>
           </a:p>
         </p:txBody>
       </p:sp>
@@ -23923,9 +23330,9 @@
           <a:bodyPr/>
           <a:lstStyle/>
           <a:p>
-            <a:fld id="{7053BEFA-1175-F644-B249-7D41D72BD3FF}" type="datetime1">
+            <a:fld id="{111EEF3B-ABF2-AA4E-9E24-0C6256942674}" type="datetime1">
               <a:rPr lang="en-US" smtClean="0"/>
-              <a:t>1/22/14</a:t>
+              <a:t>1/26/14</a:t>
             </a:fld>
             <a:endParaRPr lang="en-US"/>
           </a:p>
@@ -23933,26 +23340,7 @@
       </p:sp>
       <p:sp>
         <p:nvSpPr>
-          <p:cNvPr id="5" name="Footer Placeholder 4"/>
-          <p:cNvSpPr>
-            <a:spLocks noGrp="1"/>
-          </p:cNvSpPr>
-          <p:nvPr>
-            <p:ph type="ftr" sz="quarter" idx="11"/>
-          </p:nvPr>
-        </p:nvSpPr>
-        <p:spPr/>
-        <p:txBody>
-          <a:bodyPr/>
-          <a:lstStyle/>
-          <a:p>
-            <a:endParaRPr lang="en-US" dirty="0"/>
-          </a:p>
-        </p:txBody>
-      </p:sp>
-      <p:sp>
-        <p:nvSpPr>
-          <p:cNvPr id="6" name="Slide Number Placeholder 5"/>
+          <p:cNvPr id="5" name="Slide Number Placeholder 4"/>
           <p:cNvSpPr>
             <a:spLocks noGrp="1"/>
           </p:cNvSpPr>
@@ -23976,7 +23364,7 @@
     </p:spTree>
     <p:extLst>
       <p:ext uri="{BB962C8B-B14F-4D97-AF65-F5344CB8AC3E}">
-        <p14:creationId xmlns:p14="http://schemas.microsoft.com/office/powerpoint/2010/main" val="3809136668"/>
+        <p14:creationId xmlns:p14="http://schemas.microsoft.com/office/powerpoint/2010/main" val="992993271"/>
       </p:ext>
     </p:extLst>
   </p:cSld>
@@ -24027,7 +23415,7 @@
           <a:p>
             <a:r>
               <a:rPr lang="en-US" dirty="0" smtClean="0"/>
-              <a:t>Not all of it is packaged up for you</a:t>
+              <a:t>Lots of ‘existing’ data</a:t>
             </a:r>
             <a:endParaRPr lang="en-US" dirty="0"/>
           </a:p>
@@ -24052,137 +23440,42 @@
               <a:buNone/>
             </a:pPr>
             <a:r>
-              <a:rPr lang="en-US" dirty="0" smtClean="0"/>
-              <a:t>Web Scraping</a:t>
-            </a:r>
+              <a:rPr lang="en-US" dirty="0" smtClean="0">
+                <a:hlinkClick r:id="rId2"/>
+              </a:rPr>
+              <a:t>http</a:t>
+            </a:r>
+            <a:r>
+              <a:rPr lang="en-US" dirty="0">
+                <a:hlinkClick r:id="rId2"/>
+              </a:rPr>
+              <a:t>://</a:t>
+            </a:r>
+            <a:r>
+              <a:rPr lang="en-US" dirty="0" err="1">
+                <a:hlinkClick r:id="rId2"/>
+              </a:rPr>
+              <a:t>data.cmubi.org</a:t>
+            </a:r>
+            <a:r>
+              <a:rPr lang="en-US" dirty="0">
+                <a:hlinkClick r:id="rId2"/>
+              </a:rPr>
+              <a:t>/classroom-news/</a:t>
+            </a:r>
+            <a:r>
+              <a:rPr lang="en-US" dirty="0" err="1" smtClean="0">
+                <a:hlinkClick r:id="rId2"/>
+              </a:rPr>
+              <a:t>somegreatsourcesofdata</a:t>
+            </a:r>
+            <a:endParaRPr lang="en-US" dirty="0" smtClean="0"/>
           </a:p>
           <a:p>
             <a:pPr marL="0" indent="0">
               <a:buNone/>
             </a:pPr>
-            <a:r>
-              <a:rPr lang="en-US" dirty="0" smtClean="0"/>
-              <a:t>Web APIs</a:t>
-            </a:r>
-          </a:p>
-          <a:p>
-            <a:pPr lvl="1"/>
-            <a:r>
-              <a:rPr lang="en-US" dirty="0" smtClean="0"/>
-              <a:t>Programmatic interface to server side data </a:t>
-            </a:r>
-            <a:r>
-              <a:rPr lang="en-US" i="1" dirty="0" smtClean="0"/>
-              <a:t>and </a:t>
-            </a:r>
-            <a:r>
-              <a:rPr lang="en-US" dirty="0" smtClean="0"/>
-              <a:t>functionality</a:t>
-            </a:r>
-          </a:p>
-          <a:p>
-            <a:pPr lvl="1"/>
-            <a:r>
-              <a:rPr lang="en-US" dirty="0" smtClean="0"/>
-              <a:t>We like REST APIs best</a:t>
-            </a:r>
-          </a:p>
-          <a:p>
-            <a:pPr marL="0" indent="0">
-              <a:buNone/>
-            </a:pPr>
-            <a:r>
-              <a:rPr lang="en-US" dirty="0" smtClean="0"/>
-              <a:t>Lots of websites have them</a:t>
-            </a:r>
-          </a:p>
-          <a:p>
-            <a:pPr marL="228600" lvl="1" indent="0">
-              <a:buNone/>
-            </a:pPr>
-            <a:r>
-              <a:rPr lang="en-US" sz="2000" dirty="0"/>
-              <a:t>http://</a:t>
-            </a:r>
-            <a:r>
-              <a:rPr lang="en-US" sz="2000" dirty="0" err="1"/>
-              <a:t>en.wikipedia.org</a:t>
-            </a:r>
-            <a:r>
-              <a:rPr lang="en-US" sz="2000" dirty="0"/>
-              <a:t>/wiki/</a:t>
-            </a:r>
-            <a:r>
-              <a:rPr lang="en-US" sz="2000" dirty="0" err="1"/>
-              <a:t>List_of_open_APIs</a:t>
-            </a:r>
-            <a:endParaRPr lang="en-US" sz="2000" dirty="0" smtClean="0"/>
-          </a:p>
-          <a:p>
-            <a:pPr marL="228600" lvl="1" indent="0">
-              <a:buNone/>
-            </a:pPr>
-            <a:r>
-              <a:rPr lang="en-US" sz="2000" dirty="0"/>
-              <a:t>http://</a:t>
-            </a:r>
-            <a:r>
-              <a:rPr lang="en-US" sz="2000" dirty="0" err="1"/>
-              <a:t>www.programmableweb.com</a:t>
-            </a:r>
-            <a:r>
-              <a:rPr lang="en-US" sz="2000" dirty="0"/>
-              <a:t>/</a:t>
-            </a:r>
-            <a:r>
-              <a:rPr lang="en-US" sz="2000" dirty="0" err="1"/>
-              <a:t>apis</a:t>
-            </a:r>
-            <a:r>
-              <a:rPr lang="en-US" sz="2000" dirty="0"/>
-              <a:t>/directory </a:t>
-            </a:r>
-            <a:endParaRPr lang="en-US" sz="2000" dirty="0" smtClean="0"/>
-          </a:p>
-          <a:p>
-            <a:pPr marL="228600" lvl="1" indent="0">
-              <a:buNone/>
-            </a:pPr>
-            <a:r>
-              <a:rPr lang="en-US" sz="2000" dirty="0">
-                <a:hlinkClick r:id="rId3"/>
-              </a:rPr>
-              <a:t>http://www.webdesignerdepot.com/2011/07/40-useful-apis-for-web-designers-and-developers</a:t>
-            </a:r>
-            <a:r>
-              <a:rPr lang="en-US" sz="2000" dirty="0" smtClean="0">
-                <a:hlinkClick r:id="rId3"/>
-              </a:rPr>
-              <a:t>/</a:t>
-            </a:r>
-            <a:endParaRPr lang="en-US" sz="2000" dirty="0" smtClean="0"/>
-          </a:p>
-          <a:p>
-            <a:pPr marL="228600" lvl="1" indent="0">
-              <a:buNone/>
-            </a:pPr>
-            <a:r>
-              <a:rPr lang="en-US" sz="2000" dirty="0"/>
-              <a:t>https://</a:t>
-            </a:r>
-            <a:r>
-              <a:rPr lang="en-US" sz="2000" dirty="0" err="1"/>
-              <a:t>www.data.gov</a:t>
-            </a:r>
-            <a:r>
-              <a:rPr lang="en-US" sz="2000" dirty="0"/>
-              <a:t>/developers/</a:t>
-            </a:r>
-            <a:r>
-              <a:rPr lang="en-US" sz="2000" dirty="0" err="1"/>
-              <a:t>apis</a:t>
-            </a:r>
-            <a:endParaRPr lang="en-US" sz="2000" dirty="0" smtClean="0"/>
+            <a:endParaRPr lang="en-US" dirty="0" smtClean="0"/>
           </a:p>
         </p:txBody>
       </p:sp>
@@ -24203,7 +23496,7 @@
           <a:p>
             <a:fld id="{7053BEFA-1175-F644-B249-7D41D72BD3FF}" type="datetime1">
               <a:rPr lang="en-US" smtClean="0"/>
-              <a:t>1/22/14</a:t>
+              <a:t>1/26/14</a:t>
             </a:fld>
             <a:endParaRPr lang="en-US"/>
           </a:p>
@@ -24254,7 +23547,7 @@
     </p:spTree>
     <p:extLst>
       <p:ext uri="{BB962C8B-B14F-4D97-AF65-F5344CB8AC3E}">
-        <p14:creationId xmlns:p14="http://schemas.microsoft.com/office/powerpoint/2010/main" val="656773709"/>
+        <p14:creationId xmlns:p14="http://schemas.microsoft.com/office/powerpoint/2010/main" val="3809136668"/>
       </p:ext>
     </p:extLst>
   </p:cSld>
@@ -24305,7 +23598,7 @@
           <a:p>
             <a:r>
               <a:rPr lang="en-US" dirty="0" smtClean="0"/>
-              <a:t>Using a Web API</a:t>
+              <a:t>Not all of it is packaged up for you</a:t>
             </a:r>
             <a:endParaRPr lang="en-US" dirty="0"/>
           </a:p>
@@ -24331,7 +23624,7 @@
             </a:pPr>
             <a:r>
               <a:rPr lang="en-US" dirty="0" smtClean="0"/>
-              <a:t>Have to start with the documentation</a:t>
+              <a:t>Web Scraping</a:t>
             </a:r>
           </a:p>
           <a:p>
@@ -24340,18 +23633,127 @@
             </a:pPr>
             <a:r>
               <a:rPr lang="en-US" dirty="0" smtClean="0"/>
-              <a:t>Typical flow</a:t>
+              <a:t>Web APIs</a:t>
+            </a:r>
+          </a:p>
+          <a:p>
+            <a:pPr lvl="1"/>
+            <a:r>
+              <a:rPr lang="en-US" dirty="0" smtClean="0"/>
+              <a:t>Programmatic interface to server side data </a:t>
+            </a:r>
+            <a:r>
+              <a:rPr lang="en-US" i="1" dirty="0" smtClean="0"/>
+              <a:t>and </a:t>
+            </a:r>
+            <a:r>
+              <a:rPr lang="en-US" dirty="0" smtClean="0"/>
+              <a:t>functionality</a:t>
+            </a:r>
+          </a:p>
+          <a:p>
+            <a:pPr lvl="1"/>
+            <a:r>
+              <a:rPr lang="en-US" dirty="0" smtClean="0"/>
+              <a:t>We like REST APIs best</a:t>
             </a:r>
           </a:p>
           <a:p>
             <a:pPr marL="0" indent="0">
               <a:buNone/>
             </a:pPr>
-            <a:endParaRPr lang="en-US" dirty="0" smtClean="0"/>
-          </a:p>
-          <a:p>
-            <a:pPr lvl="1"/>
-            <a:endParaRPr lang="en-US" dirty="0"/>
+            <a:r>
+              <a:rPr lang="en-US" dirty="0" smtClean="0"/>
+              <a:t>Lots of websites have them</a:t>
+            </a:r>
+          </a:p>
+          <a:p>
+            <a:pPr marL="228600" lvl="1" indent="0">
+              <a:buNone/>
+            </a:pPr>
+            <a:r>
+              <a:rPr lang="en-US" sz="2000" dirty="0"/>
+              <a:t>http://</a:t>
+            </a:r>
+            <a:r>
+              <a:rPr lang="en-US" sz="2000" dirty="0" err="1"/>
+              <a:t>en.wikipedia.org</a:t>
+            </a:r>
+            <a:r>
+              <a:rPr lang="en-US" sz="2000" dirty="0"/>
+              <a:t>/wiki/</a:t>
+            </a:r>
+            <a:r>
+              <a:rPr lang="en-US" sz="2000" dirty="0" err="1"/>
+              <a:t>List_of_open_APIs</a:t>
+            </a:r>
+            <a:endParaRPr lang="en-US" sz="2000" dirty="0" smtClean="0"/>
+          </a:p>
+          <a:p>
+            <a:pPr marL="228600" lvl="1" indent="0">
+              <a:buNone/>
+            </a:pPr>
+            <a:r>
+              <a:rPr lang="en-US" sz="2000" dirty="0"/>
+              <a:t>http://</a:t>
+            </a:r>
+            <a:r>
+              <a:rPr lang="en-US" sz="2000" dirty="0" err="1"/>
+              <a:t>www.programmableweb.com</a:t>
+            </a:r>
+            <a:r>
+              <a:rPr lang="en-US" sz="2000" dirty="0"/>
+              <a:t>/</a:t>
+            </a:r>
+            <a:r>
+              <a:rPr lang="en-US" sz="2000" dirty="0" err="1"/>
+              <a:t>apis</a:t>
+            </a:r>
+            <a:r>
+              <a:rPr lang="en-US" sz="2000" dirty="0"/>
+              <a:t>/directory </a:t>
+            </a:r>
+            <a:endParaRPr lang="en-US" sz="2000" dirty="0" smtClean="0"/>
+          </a:p>
+          <a:p>
+            <a:pPr marL="228600" lvl="1" indent="0">
+              <a:buNone/>
+            </a:pPr>
+            <a:r>
+              <a:rPr lang="en-US" sz="2000" dirty="0">
+                <a:hlinkClick r:id="rId3"/>
+              </a:rPr>
+              <a:t>http://www.webdesignerdepot.com/2011/07/40-useful-apis-for-web-designers-and-developers</a:t>
+            </a:r>
+            <a:r>
+              <a:rPr lang="en-US" sz="2000" dirty="0" smtClean="0">
+                <a:hlinkClick r:id="rId3"/>
+              </a:rPr>
+              <a:t>/</a:t>
+            </a:r>
+            <a:endParaRPr lang="en-US" sz="2000" dirty="0" smtClean="0"/>
+          </a:p>
+          <a:p>
+            <a:pPr marL="228600" lvl="1" indent="0">
+              <a:buNone/>
+            </a:pPr>
+            <a:r>
+              <a:rPr lang="en-US" sz="2000" dirty="0"/>
+              <a:t>https://</a:t>
+            </a:r>
+            <a:r>
+              <a:rPr lang="en-US" sz="2000" dirty="0" err="1"/>
+              <a:t>www.data.gov</a:t>
+            </a:r>
+            <a:r>
+              <a:rPr lang="en-US" sz="2000" dirty="0"/>
+              <a:t>/developers/</a:t>
+            </a:r>
+            <a:r>
+              <a:rPr lang="en-US" sz="2000" dirty="0" err="1"/>
+              <a:t>apis</a:t>
+            </a:r>
+            <a:endParaRPr lang="en-US" sz="2000" dirty="0" smtClean="0"/>
           </a:p>
         </p:txBody>
       </p:sp>
@@ -24372,7 +23774,7 @@
           <a:p>
             <a:fld id="{7053BEFA-1175-F644-B249-7D41D72BD3FF}" type="datetime1">
               <a:rPr lang="en-US" smtClean="0"/>
-              <a:t>1/22/14</a:t>
+              <a:t>1/26/14</a:t>
             </a:fld>
             <a:endParaRPr lang="en-US"/>
           </a:p>
@@ -24420,32 +23822,10 @@
           </a:p>
         </p:txBody>
       </p:sp>
-      <p:graphicFrame>
-        <p:nvGraphicFramePr>
-          <p:cNvPr id="8" name="Diagram 7"/>
-          <p:cNvGraphicFramePr/>
-          <p:nvPr>
-            <p:extLst>
-              <p:ext uri="{D42A27DB-BD31-4B8C-83A1-F6EECF244321}">
-                <p14:modId xmlns:p14="http://schemas.microsoft.com/office/powerpoint/2010/main" val="2218507259"/>
-              </p:ext>
-            </p:extLst>
-          </p:nvPr>
-        </p:nvGraphicFramePr>
-        <p:xfrm>
-          <a:off x="357902" y="1446525"/>
-          <a:ext cx="8312471" cy="5314401"/>
-        </p:xfrm>
-        <a:graphic>
-          <a:graphicData uri="http://schemas.openxmlformats.org/drawingml/2006/diagram">
-            <dgm:relIds xmlns:dgm="http://schemas.openxmlformats.org/drawingml/2006/diagram" xmlns:r="http://schemas.openxmlformats.org/officeDocument/2006/relationships" r:dm="rId2" r:lo="rId3" r:qs="rId4" r:cs="rId5"/>
-          </a:graphicData>
-        </a:graphic>
-      </p:graphicFrame>
     </p:spTree>
     <p:extLst>
       <p:ext uri="{BB962C8B-B14F-4D97-AF65-F5344CB8AC3E}">
-        <p14:creationId xmlns:p14="http://schemas.microsoft.com/office/powerpoint/2010/main" val="3331848107"/>
+        <p14:creationId xmlns:p14="http://schemas.microsoft.com/office/powerpoint/2010/main" val="656773709"/>
       </p:ext>
     </p:extLst>
   </p:cSld>
@@ -24496,7 +23876,7 @@
           <a:p>
             <a:r>
               <a:rPr lang="en-US" dirty="0" smtClean="0"/>
-              <a:t>Why should the server trust you?</a:t>
+              <a:t>Using a Web API</a:t>
             </a:r>
             <a:endParaRPr lang="en-US" dirty="0"/>
           </a:p>
@@ -24522,28 +23902,16 @@
             </a:pPr>
             <a:r>
               <a:rPr lang="en-US" dirty="0" smtClean="0"/>
-              <a:t>You have the user’s password (should you?)</a:t>
-            </a:r>
-          </a:p>
-          <a:p>
-            <a:pPr lvl="1"/>
-            <a:r>
-              <a:rPr lang="en-US" dirty="0"/>
-              <a:t>Would you store it? </a:t>
-            </a:r>
-          </a:p>
-          <a:p>
-            <a:pPr lvl="1"/>
-            <a:r>
-              <a:rPr lang="en-US" dirty="0"/>
-              <a:t>What else could you do with it? </a:t>
-            </a:r>
-          </a:p>
-          <a:p>
-            <a:pPr lvl="1"/>
-            <a:r>
-              <a:rPr lang="en-US" dirty="0"/>
-              <a:t>How do users revoke access?</a:t>
+              <a:t>Have to start with the documentation</a:t>
+            </a:r>
+          </a:p>
+          <a:p>
+            <a:pPr marL="0" indent="0">
+              <a:buNone/>
+            </a:pPr>
+            <a:r>
+              <a:rPr lang="en-US" dirty="0" smtClean="0"/>
+              <a:t>Typical flow</a:t>
             </a:r>
           </a:p>
           <a:p>
@@ -24553,9 +23921,7 @@
             <a:endParaRPr lang="en-US" dirty="0" smtClean="0"/>
           </a:p>
           <a:p>
-            <a:pPr marL="0" indent="0">
-              <a:buNone/>
-            </a:pPr>
+            <a:pPr lvl="1"/>
             <a:endParaRPr lang="en-US" dirty="0"/>
           </a:p>
         </p:txBody>
@@ -24577,7 +23943,7 @@
           <a:p>
             <a:fld id="{7053BEFA-1175-F644-B249-7D41D72BD3FF}" type="datetime1">
               <a:rPr lang="en-US" smtClean="0"/>
-              <a:t>1/22/14</a:t>
+              <a:t>1/26/14</a:t>
             </a:fld>
             <a:endParaRPr lang="en-US"/>
           </a:p>
@@ -24625,10 +23991,32 @@
           </a:p>
         </p:txBody>
       </p:sp>
+      <p:graphicFrame>
+        <p:nvGraphicFramePr>
+          <p:cNvPr id="8" name="Diagram 7"/>
+          <p:cNvGraphicFramePr/>
+          <p:nvPr>
+            <p:extLst>
+              <p:ext uri="{D42A27DB-BD31-4B8C-83A1-F6EECF244321}">
+                <p14:modId xmlns:p14="http://schemas.microsoft.com/office/powerpoint/2010/main" val="2218507259"/>
+              </p:ext>
+            </p:extLst>
+          </p:nvPr>
+        </p:nvGraphicFramePr>
+        <p:xfrm>
+          <a:off x="357902" y="1446525"/>
+          <a:ext cx="8312471" cy="5314401"/>
+        </p:xfrm>
+        <a:graphic>
+          <a:graphicData uri="http://schemas.openxmlformats.org/drawingml/2006/diagram">
+            <dgm:relIds xmlns:dgm="http://schemas.openxmlformats.org/drawingml/2006/diagram" xmlns:r="http://schemas.openxmlformats.org/officeDocument/2006/relationships" r:dm="rId2" r:lo="rId3" r:qs="rId4" r:cs="rId5"/>
+          </a:graphicData>
+        </a:graphic>
+      </p:graphicFrame>
     </p:spTree>
     <p:extLst>
       <p:ext uri="{BB962C8B-B14F-4D97-AF65-F5344CB8AC3E}">
-        <p14:creationId xmlns:p14="http://schemas.microsoft.com/office/powerpoint/2010/main" val="326319157"/>
+        <p14:creationId xmlns:p14="http://schemas.microsoft.com/office/powerpoint/2010/main" val="3331848107"/>
       </p:ext>
     </p:extLst>
   </p:cSld>
@@ -24709,26 +24097,24 @@
             </a:r>
           </a:p>
           <a:p>
-            <a:pPr marL="0" indent="0">
-              <a:buNone/>
-            </a:pPr>
-            <a:r>
-              <a:rPr lang="en-US" dirty="0" smtClean="0"/>
-              <a:t>You have an API key</a:t>
-            </a:r>
-          </a:p>
-          <a:p>
             <a:pPr lvl="1"/>
             <a:r>
-              <a:rPr lang="en-US" dirty="0" smtClean="0"/>
-              <a:t>Reasonable for publicly available data</a:t>
+              <a:rPr lang="en-US" dirty="0"/>
+              <a:t>Would you store it? </a:t>
             </a:r>
           </a:p>
           <a:p>
             <a:pPr lvl="1"/>
             <a:r>
-              <a:rPr lang="en-US" dirty="0" smtClean="0"/>
-              <a:t>Lets the owner of the application track use; enforce rules &amp; revoke access</a:t>
+              <a:rPr lang="en-US" dirty="0"/>
+              <a:t>What else could you do with it? </a:t>
+            </a:r>
+          </a:p>
+          <a:p>
+            <a:pPr lvl="1"/>
+            <a:r>
+              <a:rPr lang="en-US" dirty="0"/>
+              <a:t>How do users revoke access?</a:t>
             </a:r>
           </a:p>
           <a:p>
@@ -24762,7 +24148,7 @@
           <a:p>
             <a:fld id="{7053BEFA-1175-F644-B249-7D41D72BD3FF}" type="datetime1">
               <a:rPr lang="en-US" smtClean="0"/>
-              <a:t>1/22/14</a:t>
+              <a:t>1/26/14</a:t>
             </a:fld>
             <a:endParaRPr lang="en-US"/>
           </a:p>
@@ -24813,7 +24199,7 @@
     </p:spTree>
     <p:extLst>
       <p:ext uri="{BB962C8B-B14F-4D97-AF65-F5344CB8AC3E}">
-        <p14:creationId xmlns:p14="http://schemas.microsoft.com/office/powerpoint/2010/main" val="1372213930"/>
+        <p14:creationId xmlns:p14="http://schemas.microsoft.com/office/powerpoint/2010/main" val="326319157"/>
       </p:ext>
     </p:extLst>
   </p:cSld>
@@ -24899,17 +24285,28 @@
             </a:pPr>
             <a:r>
               <a:rPr lang="en-US" dirty="0" smtClean="0"/>
-              <a:t>You have an API key (how do you get it?)</a:t>
+              <a:t>You have an API key</a:t>
+            </a:r>
+          </a:p>
+          <a:p>
+            <a:pPr lvl="1"/>
+            <a:r>
+              <a:rPr lang="en-US" dirty="0" smtClean="0"/>
+              <a:t>Reasonable for publicly available data</a:t>
+            </a:r>
+          </a:p>
+          <a:p>
+            <a:pPr lvl="1"/>
+            <a:r>
+              <a:rPr lang="en-US" dirty="0" smtClean="0"/>
+              <a:t>Lets the owner of the application track use; enforce rules &amp; revoke access</a:t>
             </a:r>
           </a:p>
           <a:p>
             <a:pPr marL="0" indent="0">
               <a:buNone/>
             </a:pPr>
-            <a:r>
-              <a:rPr lang="en-US" dirty="0" smtClean="0"/>
-              <a:t>Once:</a:t>
-            </a:r>
+            <a:endParaRPr lang="en-US" dirty="0" smtClean="0"/>
           </a:p>
           <a:p>
             <a:pPr marL="0" indent="0">
@@ -24917,22 +24314,6 @@
             </a:pPr>
             <a:endParaRPr lang="en-US" dirty="0"/>
           </a:p>
-          <a:p>
-            <a:pPr marL="0" indent="0">
-              <a:buNone/>
-            </a:pPr>
-            <a:endParaRPr lang="en-US" dirty="0" smtClean="0"/>
-          </a:p>
-          <a:p>
-            <a:pPr marL="0" indent="0">
-              <a:buNone/>
-            </a:pPr>
-            <a:r>
-              <a:rPr lang="en-US" dirty="0" smtClean="0"/>
-              <a:t>Every URL: includes the key</a:t>
-            </a:r>
-            <a:endParaRPr lang="en-US" dirty="0"/>
-          </a:p>
         </p:txBody>
       </p:sp>
       <p:sp>
@@ -24952,7 +24333,7 @@
           <a:p>
             <a:fld id="{7053BEFA-1175-F644-B249-7D41D72BD3FF}" type="datetime1">
               <a:rPr lang="en-US" smtClean="0"/>
-              <a:t>1/22/14</a:t>
+              <a:t>1/26/14</a:t>
             </a:fld>
             <a:endParaRPr lang="en-US"/>
           </a:p>
@@ -25000,74 +24381,10 @@
           </a:p>
         </p:txBody>
       </p:sp>
-      <p:graphicFrame>
-        <p:nvGraphicFramePr>
-          <p:cNvPr id="7" name="Diagram 6"/>
-          <p:cNvGraphicFramePr/>
-          <p:nvPr>
-            <p:extLst>
-              <p:ext uri="{D42A27DB-BD31-4B8C-83A1-F6EECF244321}">
-                <p14:modId xmlns:p14="http://schemas.microsoft.com/office/powerpoint/2010/main" val="1716516943"/>
-              </p:ext>
-            </p:extLst>
-          </p:nvPr>
-        </p:nvGraphicFramePr>
-        <p:xfrm>
-          <a:off x="357902" y="2978464"/>
-          <a:ext cx="8312471" cy="5314401"/>
-        </p:xfrm>
-        <a:graphic>
-          <a:graphicData uri="http://schemas.openxmlformats.org/drawingml/2006/diagram">
-            <dgm:relIds xmlns:dgm="http://schemas.openxmlformats.org/drawingml/2006/diagram" xmlns:r="http://schemas.openxmlformats.org/officeDocument/2006/relationships" r:dm="rId3" r:lo="rId4" r:qs="rId5" r:cs="rId6"/>
-          </a:graphicData>
-        </a:graphic>
-      </p:graphicFrame>
-      <p:sp>
-        <p:nvSpPr>
-          <p:cNvPr id="8" name="Rounded Rectangle 7"/>
-          <p:cNvSpPr/>
-          <p:nvPr/>
-        </p:nvSpPr>
-        <p:spPr>
-          <a:xfrm>
-            <a:off x="2389902" y="2978464"/>
-            <a:ext cx="1521698" cy="1143000"/>
-          </a:xfrm>
-          <a:prstGeom prst="roundRect">
-            <a:avLst/>
-          </a:prstGeom>
-        </p:spPr>
-        <p:style>
-          <a:lnRef idx="3">
-            <a:schemeClr val="lt1"/>
-          </a:lnRef>
-          <a:fillRef idx="1">
-            <a:schemeClr val="accent1"/>
-          </a:fillRef>
-          <a:effectRef idx="1">
-            <a:schemeClr val="accent1"/>
-          </a:effectRef>
-          <a:fontRef idx="minor">
-            <a:schemeClr val="lt1"/>
-          </a:fontRef>
-        </p:style>
-        <p:txBody>
-          <a:bodyPr rtlCol="0" anchor="ctr"/>
-          <a:lstStyle/>
-          <a:p>
-            <a:pPr algn="ctr"/>
-            <a:r>
-              <a:rPr lang="en-US" dirty="0" smtClean="0"/>
-              <a:t>Manually Register for Key</a:t>
-            </a:r>
-            <a:endParaRPr lang="en-US" dirty="0"/>
-          </a:p>
-        </p:txBody>
-      </p:sp>
     </p:spTree>
     <p:extLst>
       <p:ext uri="{BB962C8B-B14F-4D97-AF65-F5344CB8AC3E}">
-        <p14:creationId xmlns:p14="http://schemas.microsoft.com/office/powerpoint/2010/main" val="1612594849"/>
+        <p14:creationId xmlns:p14="http://schemas.microsoft.com/office/powerpoint/2010/main" val="1372213930"/>
       </p:ext>
     </p:extLst>
   </p:cSld>
@@ -25153,7 +24470,7 @@
             </a:pPr>
             <a:r>
               <a:rPr lang="en-US" dirty="0" smtClean="0"/>
-              <a:t>You have an API key</a:t>
+              <a:t>You have an API key (how do you get it?)</a:t>
             </a:r>
           </a:p>
           <a:p>
@@ -25162,76 +24479,8 @@
             </a:pPr>
             <a:r>
               <a:rPr lang="en-US" dirty="0" smtClean="0"/>
-              <a:t>You use </a:t>
-            </a:r>
-            <a:r>
-              <a:rPr lang="en-US" dirty="0" err="1" smtClean="0"/>
-              <a:t>Oauth</a:t>
-            </a:r>
-            <a:r>
-              <a:rPr lang="en-US" dirty="0" smtClean="0"/>
-              <a:t> 2.0</a:t>
-            </a:r>
-          </a:p>
-          <a:p>
-            <a:pPr lvl="1"/>
-            <a:r>
-              <a:rPr lang="en-US" dirty="0" smtClean="0"/>
-              <a:t>Gives the </a:t>
-            </a:r>
-            <a:r>
-              <a:rPr lang="en-US" i="1" dirty="0" smtClean="0"/>
-              <a:t>Resource Owner </a:t>
-            </a:r>
-            <a:r>
-              <a:rPr lang="en-US" dirty="0" smtClean="0"/>
-              <a:t>control</a:t>
-            </a:r>
-          </a:p>
-          <a:p>
-            <a:pPr lvl="1"/>
-            <a:r>
-              <a:rPr lang="en-US" dirty="0" smtClean="0"/>
-              <a:t>Gives the application owner control: </a:t>
-            </a:r>
-            <a:br>
-              <a:rPr lang="en-US" dirty="0" smtClean="0"/>
-            </a:br>
-            <a:r>
-              <a:rPr lang="en-US" i="1" dirty="0" smtClean="0"/>
-              <a:t>Resource Server </a:t>
-            </a:r>
-            <a:r>
-              <a:rPr lang="en-US" dirty="0" smtClean="0"/>
-              <a:t>serves the API</a:t>
-            </a:r>
-            <a:br>
-              <a:rPr lang="en-US" dirty="0" smtClean="0"/>
-            </a:br>
-            <a:r>
-              <a:rPr lang="en-US" i="1" dirty="0" smtClean="0"/>
-              <a:t>Authorization Server </a:t>
-            </a:r>
-            <a:r>
-              <a:rPr lang="en-US" dirty="0" smtClean="0"/>
-              <a:t>serves the key</a:t>
-            </a:r>
-          </a:p>
-          <a:p>
-            <a:pPr lvl="1"/>
-            <a:r>
-              <a:rPr lang="en-US" dirty="0" smtClean="0"/>
-              <a:t>You are the </a:t>
-            </a:r>
-            <a:r>
-              <a:rPr lang="en-US" i="1" dirty="0" smtClean="0"/>
-              <a:t>Client</a:t>
-            </a:r>
-            <a:endParaRPr lang="en-US" dirty="0" smtClean="0"/>
-          </a:p>
-          <a:p>
-            <a:pPr lvl="1"/>
-            <a:endParaRPr lang="en-US" dirty="0" smtClean="0"/>
+              <a:t>Once:</a:t>
+            </a:r>
           </a:p>
           <a:p>
             <a:pPr marL="0" indent="0">
@@ -25239,6 +24488,22 @@
             </a:pPr>
             <a:endParaRPr lang="en-US" dirty="0"/>
           </a:p>
+          <a:p>
+            <a:pPr marL="0" indent="0">
+              <a:buNone/>
+            </a:pPr>
+            <a:endParaRPr lang="en-US" dirty="0" smtClean="0"/>
+          </a:p>
+          <a:p>
+            <a:pPr marL="0" indent="0">
+              <a:buNone/>
+            </a:pPr>
+            <a:r>
+              <a:rPr lang="en-US" dirty="0" smtClean="0"/>
+              <a:t>Every URL: includes the key</a:t>
+            </a:r>
+            <a:endParaRPr lang="en-US" dirty="0"/>
+          </a:p>
         </p:txBody>
       </p:sp>
       <p:sp>
@@ -25258,7 +24523,7 @@
           <a:p>
             <a:fld id="{7053BEFA-1175-F644-B249-7D41D72BD3FF}" type="datetime1">
               <a:rPr lang="en-US" smtClean="0"/>
-              <a:t>1/22/14</a:t>
+              <a:t>1/26/14</a:t>
             </a:fld>
             <a:endParaRPr lang="en-US"/>
           </a:p>
@@ -25306,10 +24571,74 @@
           </a:p>
         </p:txBody>
       </p:sp>
+      <p:graphicFrame>
+        <p:nvGraphicFramePr>
+          <p:cNvPr id="7" name="Diagram 6"/>
+          <p:cNvGraphicFramePr/>
+          <p:nvPr>
+            <p:extLst>
+              <p:ext uri="{D42A27DB-BD31-4B8C-83A1-F6EECF244321}">
+                <p14:modId xmlns:p14="http://schemas.microsoft.com/office/powerpoint/2010/main" val="1716516943"/>
+              </p:ext>
+            </p:extLst>
+          </p:nvPr>
+        </p:nvGraphicFramePr>
+        <p:xfrm>
+          <a:off x="357902" y="2978464"/>
+          <a:ext cx="8312471" cy="5314401"/>
+        </p:xfrm>
+        <a:graphic>
+          <a:graphicData uri="http://schemas.openxmlformats.org/drawingml/2006/diagram">
+            <dgm:relIds xmlns:dgm="http://schemas.openxmlformats.org/drawingml/2006/diagram" xmlns:r="http://schemas.openxmlformats.org/officeDocument/2006/relationships" r:dm="rId3" r:lo="rId4" r:qs="rId5" r:cs="rId6"/>
+          </a:graphicData>
+        </a:graphic>
+      </p:graphicFrame>
+      <p:sp>
+        <p:nvSpPr>
+          <p:cNvPr id="8" name="Rounded Rectangle 7"/>
+          <p:cNvSpPr/>
+          <p:nvPr/>
+        </p:nvSpPr>
+        <p:spPr>
+          <a:xfrm>
+            <a:off x="2389902" y="2978464"/>
+            <a:ext cx="1521698" cy="1143000"/>
+          </a:xfrm>
+          <a:prstGeom prst="roundRect">
+            <a:avLst/>
+          </a:prstGeom>
+        </p:spPr>
+        <p:style>
+          <a:lnRef idx="3">
+            <a:schemeClr val="lt1"/>
+          </a:lnRef>
+          <a:fillRef idx="1">
+            <a:schemeClr val="accent1"/>
+          </a:fillRef>
+          <a:effectRef idx="1">
+            <a:schemeClr val="accent1"/>
+          </a:effectRef>
+          <a:fontRef idx="minor">
+            <a:schemeClr val="lt1"/>
+          </a:fontRef>
+        </p:style>
+        <p:txBody>
+          <a:bodyPr rtlCol="0" anchor="ctr"/>
+          <a:lstStyle/>
+          <a:p>
+            <a:pPr algn="ctr"/>
+            <a:r>
+              <a:rPr lang="en-US" dirty="0" smtClean="0"/>
+              <a:t>Manually Register for Key</a:t>
+            </a:r>
+            <a:endParaRPr lang="en-US" dirty="0"/>
+          </a:p>
+        </p:txBody>
+      </p:sp>
     </p:spTree>
     <p:extLst>
       <p:ext uri="{BB962C8B-B14F-4D97-AF65-F5344CB8AC3E}">
-        <p14:creationId xmlns:p14="http://schemas.microsoft.com/office/powerpoint/2010/main" val="3932398159"/>
+        <p14:creationId xmlns:p14="http://schemas.microsoft.com/office/powerpoint/2010/main" val="1612594849"/>
       </p:ext>
     </p:extLst>
   </p:cSld>
@@ -25383,7 +24712,7 @@
           <a:p>
             <a:fld id="{111EEF3B-ABF2-AA4E-9E24-0C6256942674}" type="datetime1">
               <a:rPr lang="en-US" smtClean="0"/>
-              <a:t>1/22/14</a:t>
+              <a:t>1/26/14</a:t>
             </a:fld>
             <a:endParaRPr lang="en-US"/>
           </a:p>
@@ -25602,16 +24931,125 @@
           <a:p>
             <a:r>
               <a:rPr lang="en-US" dirty="0" smtClean="0"/>
-              <a:t>Typical </a:t>
+              <a:t>Why should the server trust you?</a:t>
+            </a:r>
+            <a:endParaRPr lang="en-US" dirty="0"/>
+          </a:p>
+        </p:txBody>
+      </p:sp>
+      <p:sp>
+        <p:nvSpPr>
+          <p:cNvPr id="3" name="Content Placeholder 2"/>
+          <p:cNvSpPr>
+            <a:spLocks noGrp="1"/>
+          </p:cNvSpPr>
+          <p:nvPr>
+            <p:ph idx="1"/>
+          </p:nvPr>
+        </p:nvSpPr>
+        <p:spPr/>
+        <p:txBody>
+          <a:bodyPr/>
+          <a:lstStyle/>
+          <a:p>
+            <a:pPr marL="0" indent="0">
+              <a:buNone/>
+            </a:pPr>
+            <a:r>
+              <a:rPr lang="en-US" dirty="0" smtClean="0"/>
+              <a:t>You have the user’s password (should you?)</a:t>
+            </a:r>
+          </a:p>
+          <a:p>
+            <a:pPr marL="0" indent="0">
+              <a:buNone/>
+            </a:pPr>
+            <a:r>
+              <a:rPr lang="en-US" dirty="0" smtClean="0"/>
+              <a:t>You have an API key</a:t>
+            </a:r>
+          </a:p>
+          <a:p>
+            <a:pPr marL="0" indent="0">
+              <a:buNone/>
+            </a:pPr>
+            <a:r>
+              <a:rPr lang="en-US" dirty="0" smtClean="0"/>
+              <a:t>You use </a:t>
             </a:r>
             <a:r>
               <a:rPr lang="en-US" dirty="0" err="1" smtClean="0"/>
-              <a:t>OAuth</a:t>
+              <a:t>Oauth</a:t>
             </a:r>
             <a:r>
               <a:rPr lang="en-US" dirty="0" smtClean="0"/>
-              <a:t> 2.0 Flow</a:t>
-            </a:r>
+              <a:t> 2.0</a:t>
+            </a:r>
+          </a:p>
+          <a:p>
+            <a:pPr lvl="1"/>
+            <a:r>
+              <a:rPr lang="en-US" dirty="0" smtClean="0"/>
+              <a:t>Gives the </a:t>
+            </a:r>
+            <a:r>
+              <a:rPr lang="en-US" i="1" dirty="0" smtClean="0"/>
+              <a:t>Resource Owner </a:t>
+            </a:r>
+            <a:r>
+              <a:rPr lang="en-US" dirty="0" smtClean="0"/>
+              <a:t>control</a:t>
+            </a:r>
+          </a:p>
+          <a:p>
+            <a:pPr lvl="1"/>
+            <a:r>
+              <a:rPr lang="en-US" dirty="0" smtClean="0"/>
+              <a:t>Gives the application owner control: </a:t>
+            </a:r>
+            <a:br>
+              <a:rPr lang="en-US" dirty="0" smtClean="0"/>
+            </a:br>
+            <a:r>
+              <a:rPr lang="en-US" i="1" dirty="0" smtClean="0"/>
+              <a:t>Resource Server </a:t>
+            </a:r>
+            <a:r>
+              <a:rPr lang="en-US" dirty="0" smtClean="0"/>
+              <a:t>serves the API</a:t>
+            </a:r>
+            <a:br>
+              <a:rPr lang="en-US" dirty="0" smtClean="0"/>
+            </a:br>
+            <a:r>
+              <a:rPr lang="en-US" i="1" dirty="0" smtClean="0"/>
+              <a:t>Authorization Server </a:t>
+            </a:r>
+            <a:r>
+              <a:rPr lang="en-US" dirty="0" smtClean="0"/>
+              <a:t>serves the key</a:t>
+            </a:r>
+          </a:p>
+          <a:p>
+            <a:pPr lvl="1"/>
+            <a:r>
+              <a:rPr lang="en-US" dirty="0" smtClean="0"/>
+              <a:t>You are the </a:t>
+            </a:r>
+            <a:r>
+              <a:rPr lang="en-US" i="1" dirty="0" smtClean="0"/>
+              <a:t>Client</a:t>
+            </a:r>
+            <a:endParaRPr lang="en-US" dirty="0" smtClean="0"/>
+          </a:p>
+          <a:p>
+            <a:pPr lvl="1"/>
+            <a:endParaRPr lang="en-US" dirty="0" smtClean="0"/>
+          </a:p>
+          <a:p>
+            <a:pPr marL="0" indent="0">
+              <a:buNone/>
+            </a:pPr>
             <a:endParaRPr lang="en-US" dirty="0"/>
           </a:p>
         </p:txBody>
@@ -25633,7 +25071,7 @@
           <a:p>
             <a:fld id="{7053BEFA-1175-F644-B249-7D41D72BD3FF}" type="datetime1">
               <a:rPr lang="en-US" smtClean="0"/>
-              <a:t>1/22/14</a:t>
+              <a:t>1/26/14</a:t>
             </a:fld>
             <a:endParaRPr lang="en-US"/>
           </a:p>
@@ -25678,263 +25116,6 @@
               <a:t>30</a:t>
             </a:fld>
             <a:endParaRPr lang="en-US" dirty="0"/>
-          </a:p>
-        </p:txBody>
-      </p:sp>
-      <p:sp>
-        <p:nvSpPr>
-          <p:cNvPr id="9" name="TextBox 8"/>
-          <p:cNvSpPr txBox="1"/>
-          <p:nvPr/>
-        </p:nvSpPr>
-        <p:spPr>
-          <a:xfrm>
-            <a:off x="304800" y="1422400"/>
-            <a:ext cx="184666" cy="461665"/>
-          </a:xfrm>
-          <a:prstGeom prst="rect">
-            <a:avLst/>
-          </a:prstGeom>
-          <a:solidFill>
-            <a:srgbClr val="FFFFFF"/>
-          </a:solidFill>
-        </p:spPr>
-        <p:txBody>
-          <a:bodyPr wrap="none" rtlCol="0">
-            <a:spAutoFit/>
-          </a:bodyPr>
-          <a:lstStyle/>
-          <a:p>
-            <a:endParaRPr lang="en-US" sz="2400" dirty="0"/>
-          </a:p>
-        </p:txBody>
-      </p:sp>
-      <p:sp>
-        <p:nvSpPr>
-          <p:cNvPr id="10" name="Rectangle 9"/>
-          <p:cNvSpPr/>
-          <p:nvPr/>
-        </p:nvSpPr>
-        <p:spPr>
-          <a:xfrm>
-            <a:off x="465996" y="4546600"/>
-            <a:ext cx="1900436" cy="1668659"/>
-          </a:xfrm>
-          <a:prstGeom prst="rect">
-            <a:avLst/>
-          </a:prstGeom>
-        </p:spPr>
-        <p:style>
-          <a:lnRef idx="2">
-            <a:schemeClr val="accent1">
-              <a:shade val="50000"/>
-            </a:schemeClr>
-          </a:lnRef>
-          <a:fillRef idx="1">
-            <a:schemeClr val="accent1"/>
-          </a:fillRef>
-          <a:effectRef idx="0">
-            <a:schemeClr val="accent1"/>
-          </a:effectRef>
-          <a:fontRef idx="minor">
-            <a:schemeClr val="lt1"/>
-          </a:fontRef>
-        </p:style>
-        <p:txBody>
-          <a:bodyPr rtlCol="0" anchor="ctr"/>
-          <a:lstStyle/>
-          <a:p>
-            <a:pPr algn="ctr"/>
-            <a:endParaRPr lang="en-US"/>
-          </a:p>
-        </p:txBody>
-      </p:sp>
-      <p:sp>
-        <p:nvSpPr>
-          <p:cNvPr id="13" name="TextBox 12"/>
-          <p:cNvSpPr txBox="1"/>
-          <p:nvPr/>
-        </p:nvSpPr>
-        <p:spPr>
-          <a:xfrm>
-            <a:off x="465996" y="4070663"/>
-            <a:ext cx="907971" cy="461665"/>
-          </a:xfrm>
-          <a:prstGeom prst="rect">
-            <a:avLst/>
-          </a:prstGeom>
-          <a:solidFill>
-            <a:srgbClr val="FFFFFF"/>
-          </a:solidFill>
-        </p:spPr>
-        <p:txBody>
-          <a:bodyPr wrap="none" rtlCol="0">
-            <a:spAutoFit/>
-          </a:bodyPr>
-          <a:lstStyle/>
-          <a:p>
-            <a:r>
-              <a:rPr lang="en-US" sz="2400" dirty="0" smtClean="0"/>
-              <a:t>Client</a:t>
-            </a:r>
-            <a:endParaRPr lang="en-US" sz="2400" dirty="0"/>
-          </a:p>
-        </p:txBody>
-      </p:sp>
-      <p:sp>
-        <p:nvSpPr>
-          <p:cNvPr id="16" name="Rounded Rectangle 15"/>
-          <p:cNvSpPr/>
-          <p:nvPr/>
-        </p:nvSpPr>
-        <p:spPr>
-          <a:xfrm>
-            <a:off x="1373967" y="1422400"/>
-            <a:ext cx="1521698" cy="1143000"/>
-          </a:xfrm>
-          <a:prstGeom prst="roundRect">
-            <a:avLst/>
-          </a:prstGeom>
-        </p:spPr>
-        <p:style>
-          <a:lnRef idx="3">
-            <a:schemeClr val="lt1"/>
-          </a:lnRef>
-          <a:fillRef idx="1">
-            <a:schemeClr val="accent1"/>
-          </a:fillRef>
-          <a:effectRef idx="1">
-            <a:schemeClr val="accent1"/>
-          </a:effectRef>
-          <a:fontRef idx="minor">
-            <a:schemeClr val="lt1"/>
-          </a:fontRef>
-        </p:style>
-        <p:txBody>
-          <a:bodyPr rtlCol="0" anchor="ctr"/>
-          <a:lstStyle/>
-          <a:p>
-            <a:pPr algn="ctr"/>
-            <a:r>
-              <a:rPr lang="en-US" dirty="0" smtClean="0"/>
-              <a:t>Manually Register Client</a:t>
-            </a:r>
-            <a:endParaRPr lang="en-US" dirty="0"/>
-          </a:p>
-        </p:txBody>
-      </p:sp>
-      <p:sp>
-        <p:nvSpPr>
-          <p:cNvPr id="17" name="TextBox 16"/>
-          <p:cNvSpPr txBox="1"/>
-          <p:nvPr/>
-        </p:nvSpPr>
-        <p:spPr>
-          <a:xfrm>
-            <a:off x="3175000" y="1468566"/>
-            <a:ext cx="1794482" cy="830997"/>
-          </a:xfrm>
-          <a:prstGeom prst="rect">
-            <a:avLst/>
-          </a:prstGeom>
-          <a:solidFill>
-            <a:srgbClr val="FFFFFF"/>
-          </a:solidFill>
-        </p:spPr>
-        <p:txBody>
-          <a:bodyPr wrap="none" rtlCol="0">
-            <a:spAutoFit/>
-          </a:bodyPr>
-          <a:lstStyle/>
-          <a:p>
-            <a:r>
-              <a:rPr lang="en-US" sz="2400" dirty="0" err="1" smtClean="0"/>
-              <a:t>client_id</a:t>
-            </a:r>
-            <a:endParaRPr lang="en-US" sz="2400" dirty="0" smtClean="0"/>
-          </a:p>
-          <a:p>
-            <a:r>
-              <a:rPr lang="en-US" sz="2400" dirty="0" err="1" smtClean="0"/>
-              <a:t>client_secret</a:t>
-            </a:r>
-            <a:endParaRPr lang="en-US" sz="2400" dirty="0"/>
-          </a:p>
-        </p:txBody>
-      </p:sp>
-      <p:sp>
-        <p:nvSpPr>
-          <p:cNvPr id="26" name="TextBox 25"/>
-          <p:cNvSpPr txBox="1"/>
-          <p:nvPr/>
-        </p:nvSpPr>
-        <p:spPr>
-          <a:xfrm>
-            <a:off x="4961796" y="4059535"/>
-            <a:ext cx="2122997" cy="461665"/>
-          </a:xfrm>
-          <a:prstGeom prst="rect">
-            <a:avLst/>
-          </a:prstGeom>
-          <a:solidFill>
-            <a:srgbClr val="FFFFFF"/>
-          </a:solidFill>
-        </p:spPr>
-        <p:txBody>
-          <a:bodyPr wrap="none" rtlCol="0">
-            <a:spAutoFit/>
-          </a:bodyPr>
-          <a:lstStyle/>
-          <a:p>
-            <a:r>
-              <a:rPr lang="en-US" sz="2400" dirty="0" err="1" smtClean="0"/>
-              <a:t>OAuth</a:t>
-            </a:r>
-            <a:r>
-              <a:rPr lang="en-US" sz="2400" dirty="0" smtClean="0"/>
-              <a:t> Provider</a:t>
-            </a:r>
-            <a:endParaRPr lang="en-US" sz="2400" dirty="0"/>
-          </a:p>
-        </p:txBody>
-      </p:sp>
-      <p:sp>
-        <p:nvSpPr>
-          <p:cNvPr id="27" name="Rectangle 26"/>
-          <p:cNvSpPr/>
-          <p:nvPr/>
-        </p:nvSpPr>
-        <p:spPr>
-          <a:xfrm>
-            <a:off x="4961796" y="4546600"/>
-            <a:ext cx="1900436" cy="1668659"/>
-          </a:xfrm>
-          <a:prstGeom prst="rect">
-            <a:avLst/>
-          </a:prstGeom>
-        </p:spPr>
-        <p:style>
-          <a:lnRef idx="2">
-            <a:schemeClr val="accent1">
-              <a:shade val="50000"/>
-            </a:schemeClr>
-          </a:lnRef>
-          <a:fillRef idx="1">
-            <a:schemeClr val="accent1"/>
-          </a:fillRef>
-          <a:effectRef idx="0">
-            <a:schemeClr val="accent1"/>
-          </a:effectRef>
-          <a:fontRef idx="minor">
-            <a:schemeClr val="lt1"/>
-          </a:fontRef>
-        </p:style>
-        <p:txBody>
-          <a:bodyPr rtlCol="0" anchor="ctr"/>
-          <a:lstStyle/>
-          <a:p>
-            <a:pPr algn="ctr"/>
-            <a:endParaRPr lang="en-US"/>
           </a:p>
         </p:txBody>
       </p:sp>
@@ -25977,6 +25158,396 @@
       </p:grpSpPr>
       <p:sp>
         <p:nvSpPr>
+          <p:cNvPr id="2" name="Title 1"/>
+          <p:cNvSpPr>
+            <a:spLocks noGrp="1"/>
+          </p:cNvSpPr>
+          <p:nvPr>
+            <p:ph type="title"/>
+          </p:nvPr>
+        </p:nvSpPr>
+        <p:spPr/>
+        <p:txBody>
+          <a:bodyPr/>
+          <a:lstStyle/>
+          <a:p>
+            <a:r>
+              <a:rPr lang="en-US" dirty="0" smtClean="0"/>
+              <a:t>Typical </a:t>
+            </a:r>
+            <a:r>
+              <a:rPr lang="en-US" dirty="0" err="1" smtClean="0"/>
+              <a:t>OAuth</a:t>
+            </a:r>
+            <a:r>
+              <a:rPr lang="en-US" dirty="0" smtClean="0"/>
+              <a:t> 2.0 Flow</a:t>
+            </a:r>
+            <a:endParaRPr lang="en-US" dirty="0"/>
+          </a:p>
+        </p:txBody>
+      </p:sp>
+      <p:sp>
+        <p:nvSpPr>
+          <p:cNvPr id="4" name="Date Placeholder 3"/>
+          <p:cNvSpPr>
+            <a:spLocks noGrp="1"/>
+          </p:cNvSpPr>
+          <p:nvPr>
+            <p:ph type="dt" sz="half" idx="10"/>
+          </p:nvPr>
+        </p:nvSpPr>
+        <p:spPr/>
+        <p:txBody>
+          <a:bodyPr/>
+          <a:lstStyle/>
+          <a:p>
+            <a:fld id="{7053BEFA-1175-F644-B249-7D41D72BD3FF}" type="datetime1">
+              <a:rPr lang="en-US" smtClean="0"/>
+              <a:t>1/26/14</a:t>
+            </a:fld>
+            <a:endParaRPr lang="en-US"/>
+          </a:p>
+        </p:txBody>
+      </p:sp>
+      <p:sp>
+        <p:nvSpPr>
+          <p:cNvPr id="5" name="Footer Placeholder 4"/>
+          <p:cNvSpPr>
+            <a:spLocks noGrp="1"/>
+          </p:cNvSpPr>
+          <p:nvPr>
+            <p:ph type="ftr" sz="quarter" idx="11"/>
+          </p:nvPr>
+        </p:nvSpPr>
+        <p:spPr/>
+        <p:txBody>
+          <a:bodyPr/>
+          <a:lstStyle/>
+          <a:p>
+            <a:endParaRPr lang="en-US" dirty="0"/>
+          </a:p>
+        </p:txBody>
+      </p:sp>
+      <p:sp>
+        <p:nvSpPr>
+          <p:cNvPr id="6" name="Slide Number Placeholder 5"/>
+          <p:cNvSpPr>
+            <a:spLocks noGrp="1"/>
+          </p:cNvSpPr>
+          <p:nvPr>
+            <p:ph type="sldNum" sz="quarter" idx="12"/>
+          </p:nvPr>
+        </p:nvSpPr>
+        <p:spPr/>
+        <p:txBody>
+          <a:bodyPr/>
+          <a:lstStyle/>
+          <a:p>
+            <a:fld id="{17E276FA-8F89-B34D-A726-BE3FA1F8DD97}" type="slidenum">
+              <a:rPr lang="en-US" smtClean="0"/>
+              <a:t>31</a:t>
+            </a:fld>
+            <a:endParaRPr lang="en-US" dirty="0"/>
+          </a:p>
+        </p:txBody>
+      </p:sp>
+      <p:sp>
+        <p:nvSpPr>
+          <p:cNvPr id="9" name="TextBox 8"/>
+          <p:cNvSpPr txBox="1"/>
+          <p:nvPr/>
+        </p:nvSpPr>
+        <p:spPr>
+          <a:xfrm>
+            <a:off x="304800" y="1422400"/>
+            <a:ext cx="184666" cy="461665"/>
+          </a:xfrm>
+          <a:prstGeom prst="rect">
+            <a:avLst/>
+          </a:prstGeom>
+          <a:solidFill>
+            <a:srgbClr val="FFFFFF"/>
+          </a:solidFill>
+        </p:spPr>
+        <p:txBody>
+          <a:bodyPr wrap="none" rtlCol="0">
+            <a:spAutoFit/>
+          </a:bodyPr>
+          <a:lstStyle/>
+          <a:p>
+            <a:endParaRPr lang="en-US" sz="2400" dirty="0"/>
+          </a:p>
+        </p:txBody>
+      </p:sp>
+      <p:sp>
+        <p:nvSpPr>
+          <p:cNvPr id="10" name="Rectangle 9"/>
+          <p:cNvSpPr/>
+          <p:nvPr/>
+        </p:nvSpPr>
+        <p:spPr>
+          <a:xfrm>
+            <a:off x="465996" y="4546600"/>
+            <a:ext cx="1900436" cy="1668659"/>
+          </a:xfrm>
+          <a:prstGeom prst="rect">
+            <a:avLst/>
+          </a:prstGeom>
+        </p:spPr>
+        <p:style>
+          <a:lnRef idx="2">
+            <a:schemeClr val="accent1">
+              <a:shade val="50000"/>
+            </a:schemeClr>
+          </a:lnRef>
+          <a:fillRef idx="1">
+            <a:schemeClr val="accent1"/>
+          </a:fillRef>
+          <a:effectRef idx="0">
+            <a:schemeClr val="accent1"/>
+          </a:effectRef>
+          <a:fontRef idx="minor">
+            <a:schemeClr val="lt1"/>
+          </a:fontRef>
+        </p:style>
+        <p:txBody>
+          <a:bodyPr rtlCol="0" anchor="ctr"/>
+          <a:lstStyle/>
+          <a:p>
+            <a:pPr algn="ctr"/>
+            <a:endParaRPr lang="en-US"/>
+          </a:p>
+        </p:txBody>
+      </p:sp>
+      <p:sp>
+        <p:nvSpPr>
+          <p:cNvPr id="13" name="TextBox 12"/>
+          <p:cNvSpPr txBox="1"/>
+          <p:nvPr/>
+        </p:nvSpPr>
+        <p:spPr>
+          <a:xfrm>
+            <a:off x="465996" y="4070663"/>
+            <a:ext cx="907971" cy="461665"/>
+          </a:xfrm>
+          <a:prstGeom prst="rect">
+            <a:avLst/>
+          </a:prstGeom>
+          <a:solidFill>
+            <a:srgbClr val="FFFFFF"/>
+          </a:solidFill>
+        </p:spPr>
+        <p:txBody>
+          <a:bodyPr wrap="none" rtlCol="0">
+            <a:spAutoFit/>
+          </a:bodyPr>
+          <a:lstStyle/>
+          <a:p>
+            <a:r>
+              <a:rPr lang="en-US" sz="2400" dirty="0" smtClean="0"/>
+              <a:t>Client</a:t>
+            </a:r>
+            <a:endParaRPr lang="en-US" sz="2400" dirty="0"/>
+          </a:p>
+        </p:txBody>
+      </p:sp>
+      <p:sp>
+        <p:nvSpPr>
+          <p:cNvPr id="16" name="Rounded Rectangle 15"/>
+          <p:cNvSpPr/>
+          <p:nvPr/>
+        </p:nvSpPr>
+        <p:spPr>
+          <a:xfrm>
+            <a:off x="1373967" y="1422400"/>
+            <a:ext cx="1521698" cy="1143000"/>
+          </a:xfrm>
+          <a:prstGeom prst="roundRect">
+            <a:avLst/>
+          </a:prstGeom>
+        </p:spPr>
+        <p:style>
+          <a:lnRef idx="3">
+            <a:schemeClr val="lt1"/>
+          </a:lnRef>
+          <a:fillRef idx="1">
+            <a:schemeClr val="accent1"/>
+          </a:fillRef>
+          <a:effectRef idx="1">
+            <a:schemeClr val="accent1"/>
+          </a:effectRef>
+          <a:fontRef idx="minor">
+            <a:schemeClr val="lt1"/>
+          </a:fontRef>
+        </p:style>
+        <p:txBody>
+          <a:bodyPr rtlCol="0" anchor="ctr"/>
+          <a:lstStyle/>
+          <a:p>
+            <a:pPr algn="ctr"/>
+            <a:r>
+              <a:rPr lang="en-US" dirty="0" smtClean="0"/>
+              <a:t>Manually Register Client</a:t>
+            </a:r>
+            <a:endParaRPr lang="en-US" dirty="0"/>
+          </a:p>
+        </p:txBody>
+      </p:sp>
+      <p:sp>
+        <p:nvSpPr>
+          <p:cNvPr id="17" name="TextBox 16"/>
+          <p:cNvSpPr txBox="1"/>
+          <p:nvPr/>
+        </p:nvSpPr>
+        <p:spPr>
+          <a:xfrm>
+            <a:off x="3175000" y="1468566"/>
+            <a:ext cx="1794482" cy="830997"/>
+          </a:xfrm>
+          <a:prstGeom prst="rect">
+            <a:avLst/>
+          </a:prstGeom>
+          <a:solidFill>
+            <a:srgbClr val="FFFFFF"/>
+          </a:solidFill>
+        </p:spPr>
+        <p:txBody>
+          <a:bodyPr wrap="none" rtlCol="0">
+            <a:spAutoFit/>
+          </a:bodyPr>
+          <a:lstStyle/>
+          <a:p>
+            <a:r>
+              <a:rPr lang="en-US" sz="2400" dirty="0" err="1" smtClean="0"/>
+              <a:t>client_id</a:t>
+            </a:r>
+            <a:endParaRPr lang="en-US" sz="2400" dirty="0" smtClean="0"/>
+          </a:p>
+          <a:p>
+            <a:r>
+              <a:rPr lang="en-US" sz="2400" dirty="0" err="1" smtClean="0"/>
+              <a:t>client_secret</a:t>
+            </a:r>
+            <a:endParaRPr lang="en-US" sz="2400" dirty="0"/>
+          </a:p>
+        </p:txBody>
+      </p:sp>
+      <p:sp>
+        <p:nvSpPr>
+          <p:cNvPr id="26" name="TextBox 25"/>
+          <p:cNvSpPr txBox="1"/>
+          <p:nvPr/>
+        </p:nvSpPr>
+        <p:spPr>
+          <a:xfrm>
+            <a:off x="4961796" y="4059535"/>
+            <a:ext cx="2122997" cy="461665"/>
+          </a:xfrm>
+          <a:prstGeom prst="rect">
+            <a:avLst/>
+          </a:prstGeom>
+          <a:solidFill>
+            <a:srgbClr val="FFFFFF"/>
+          </a:solidFill>
+        </p:spPr>
+        <p:txBody>
+          <a:bodyPr wrap="none" rtlCol="0">
+            <a:spAutoFit/>
+          </a:bodyPr>
+          <a:lstStyle/>
+          <a:p>
+            <a:r>
+              <a:rPr lang="en-US" sz="2400" dirty="0" err="1" smtClean="0"/>
+              <a:t>OAuth</a:t>
+            </a:r>
+            <a:r>
+              <a:rPr lang="en-US" sz="2400" dirty="0" smtClean="0"/>
+              <a:t> Provider</a:t>
+            </a:r>
+            <a:endParaRPr lang="en-US" sz="2400" dirty="0"/>
+          </a:p>
+        </p:txBody>
+      </p:sp>
+      <p:sp>
+        <p:nvSpPr>
+          <p:cNvPr id="27" name="Rectangle 26"/>
+          <p:cNvSpPr/>
+          <p:nvPr/>
+        </p:nvSpPr>
+        <p:spPr>
+          <a:xfrm>
+            <a:off x="4961796" y="4546600"/>
+            <a:ext cx="1900436" cy="1668659"/>
+          </a:xfrm>
+          <a:prstGeom prst="rect">
+            <a:avLst/>
+          </a:prstGeom>
+        </p:spPr>
+        <p:style>
+          <a:lnRef idx="2">
+            <a:schemeClr val="accent1">
+              <a:shade val="50000"/>
+            </a:schemeClr>
+          </a:lnRef>
+          <a:fillRef idx="1">
+            <a:schemeClr val="accent1"/>
+          </a:fillRef>
+          <a:effectRef idx="0">
+            <a:schemeClr val="accent1"/>
+          </a:effectRef>
+          <a:fontRef idx="minor">
+            <a:schemeClr val="lt1"/>
+          </a:fontRef>
+        </p:style>
+        <p:txBody>
+          <a:bodyPr rtlCol="0" anchor="ctr"/>
+          <a:lstStyle/>
+          <a:p>
+            <a:pPr algn="ctr"/>
+            <a:endParaRPr lang="en-US"/>
+          </a:p>
+        </p:txBody>
+      </p:sp>
+    </p:spTree>
+    <p:extLst>
+      <p:ext uri="{BB962C8B-B14F-4D97-AF65-F5344CB8AC3E}">
+        <p14:creationId xmlns:p14="http://schemas.microsoft.com/office/powerpoint/2010/main" val="3932398159"/>
+      </p:ext>
+    </p:extLst>
+  </p:cSld>
+  <p:clrMapOvr>
+    <a:masterClrMapping/>
+  </p:clrMapOvr>
+  <p:timing>
+    <p:tnLst>
+      <p:par>
+        <p:cTn xmlns:p14="http://schemas.microsoft.com/office/powerpoint/2010/main" id="1" dur="indefinite" restart="never" nodeType="tmRoot"/>
+      </p:par>
+    </p:tnLst>
+  </p:timing>
+</p:sld>
+</file>
+
+<file path=ppt/slides/slide32.xml><?xml version="1.0" encoding="utf-8"?>
+<p:sld xmlns:a="http://schemas.openxmlformats.org/drawingml/2006/main" xmlns:r="http://schemas.openxmlformats.org/officeDocument/2006/relationships" xmlns:p="http://schemas.openxmlformats.org/presentationml/2006/main">
+  <p:cSld>
+    <p:spTree>
+      <p:nvGrpSpPr>
+        <p:cNvPr id="1" name=""/>
+        <p:cNvGrpSpPr/>
+        <p:nvPr/>
+      </p:nvGrpSpPr>
+      <p:grpSpPr>
+        <a:xfrm>
+          <a:off x="0" y="0"/>
+          <a:ext cx="0" cy="0"/>
+          <a:chOff x="0" y="0"/>
+          <a:chExt cx="0" cy="0"/>
+        </a:xfrm>
+      </p:grpSpPr>
+      <p:sp>
+        <p:nvSpPr>
           <p:cNvPr id="19" name="TextBox 18"/>
           <p:cNvSpPr txBox="1"/>
           <p:nvPr/>
@@ -26078,7 +25649,7 @@
           <a:p>
             <a:fld id="{7053BEFA-1175-F644-B249-7D41D72BD3FF}" type="datetime1">
               <a:rPr lang="en-US" smtClean="0"/>
-              <a:t>1/22/14</a:t>
+              <a:t>1/26/14</a:t>
             </a:fld>
             <a:endParaRPr lang="en-US"/>
           </a:p>
@@ -26120,7 +25691,7 @@
           <a:p>
             <a:fld id="{17E276FA-8F89-B34D-A726-BE3FA1F8DD97}" type="slidenum">
               <a:rPr lang="en-US" smtClean="0"/>
-              <a:t>31</a:t>
+              <a:t>32</a:t>
             </a:fld>
             <a:endParaRPr lang="en-US" dirty="0"/>
           </a:p>
@@ -26436,7 +26007,7 @@
 </p:sld>
 </file>
 
-<file path=ppt/slides/slide32.xml><?xml version="1.0" encoding="utf-8"?>
+<file path=ppt/slides/slide33.xml><?xml version="1.0" encoding="utf-8"?>
 <p:sld xmlns:a="http://schemas.openxmlformats.org/drawingml/2006/main" xmlns:r="http://schemas.openxmlformats.org/officeDocument/2006/relationships" xmlns:p="http://schemas.openxmlformats.org/presentationml/2006/main">
   <p:cSld>
     <p:spTree>
@@ -26501,7 +26072,7 @@
           <a:p>
             <a:fld id="{7053BEFA-1175-F644-B249-7D41D72BD3FF}" type="datetime1">
               <a:rPr lang="en-US" smtClean="0"/>
-              <a:t>1/22/14</a:t>
+              <a:t>1/26/14</a:t>
             </a:fld>
             <a:endParaRPr lang="en-US"/>
           </a:p>
@@ -26543,7 +26114,7 @@
           <a:p>
             <a:fld id="{17E276FA-8F89-B34D-A726-BE3FA1F8DD97}" type="slidenum">
               <a:rPr lang="en-US" smtClean="0"/>
-              <a:t>32</a:t>
+              <a:t>33</a:t>
             </a:fld>
             <a:endParaRPr lang="en-US" dirty="0"/>
           </a:p>
@@ -26854,268 +26425,6 @@
     <p:extLst>
       <p:ext uri="{BB962C8B-B14F-4D97-AF65-F5344CB8AC3E}">
         <p14:creationId xmlns:p14="http://schemas.microsoft.com/office/powerpoint/2010/main" val="866809042"/>
-      </p:ext>
-    </p:extLst>
-  </p:cSld>
-  <p:clrMapOvr>
-    <a:masterClrMapping/>
-  </p:clrMapOvr>
-  <p:timing>
-    <p:tnLst>
-      <p:par>
-        <p:cTn xmlns:p14="http://schemas.microsoft.com/office/powerpoint/2010/main" id="1" dur="indefinite" restart="never" nodeType="tmRoot"/>
-      </p:par>
-    </p:tnLst>
-  </p:timing>
-</p:sld>
-</file>
-
-<file path=ppt/slides/slide33.xml><?xml version="1.0" encoding="utf-8"?>
-<p:sld xmlns:a="http://schemas.openxmlformats.org/drawingml/2006/main" xmlns:r="http://schemas.openxmlformats.org/officeDocument/2006/relationships" xmlns:p="http://schemas.openxmlformats.org/presentationml/2006/main">
-  <p:cSld>
-    <p:spTree>
-      <p:nvGrpSpPr>
-        <p:cNvPr id="1" name=""/>
-        <p:cNvGrpSpPr/>
-        <p:nvPr/>
-      </p:nvGrpSpPr>
-      <p:grpSpPr>
-        <a:xfrm>
-          <a:off x="0" y="0"/>
-          <a:ext cx="0" cy="0"/>
-          <a:chOff x="0" y="0"/>
-          <a:chExt cx="0" cy="0"/>
-        </a:xfrm>
-      </p:grpSpPr>
-      <p:sp>
-        <p:nvSpPr>
-          <p:cNvPr id="2" name="Title 1"/>
-          <p:cNvSpPr>
-            <a:spLocks noGrp="1"/>
-          </p:cNvSpPr>
-          <p:nvPr>
-            <p:ph type="title"/>
-          </p:nvPr>
-        </p:nvSpPr>
-        <p:spPr/>
-        <p:txBody>
-          <a:bodyPr/>
-          <a:lstStyle/>
-          <a:p>
-            <a:r>
-              <a:rPr lang="en-US" dirty="0" smtClean="0"/>
-              <a:t>Hi user!</a:t>
-            </a:r>
-            <a:endParaRPr lang="en-US" dirty="0"/>
-          </a:p>
-        </p:txBody>
-      </p:sp>
-      <p:sp>
-        <p:nvSpPr>
-          <p:cNvPr id="3" name="Content Placeholder 2"/>
-          <p:cNvSpPr>
-            <a:spLocks noGrp="1"/>
-          </p:cNvSpPr>
-          <p:nvPr>
-            <p:ph idx="1"/>
-          </p:nvPr>
-        </p:nvSpPr>
-        <p:spPr/>
-        <p:txBody>
-          <a:bodyPr/>
-          <a:lstStyle/>
-          <a:p>
-            <a:pPr marL="0" indent="0">
-              <a:buNone/>
-            </a:pPr>
-            <a:r>
-              <a:rPr lang="en-US" dirty="0" smtClean="0"/>
-              <a:t>[served by </a:t>
-            </a:r>
-            <a:r>
-              <a:rPr lang="en-US" i="1" dirty="0" smtClean="0"/>
-              <a:t>Authorization Server, </a:t>
-            </a:r>
-            <a:r>
-              <a:rPr lang="en-US" dirty="0" smtClean="0"/>
-              <a:t>not you]</a:t>
-            </a:r>
-            <a:endParaRPr lang="en-US" i="1" dirty="0" smtClean="0"/>
-          </a:p>
-          <a:p>
-            <a:pPr marL="0" indent="0">
-              <a:buNone/>
-            </a:pPr>
-            <a:endParaRPr lang="en-US" dirty="0"/>
-          </a:p>
-          <a:p>
-            <a:pPr marL="0" indent="0">
-              <a:buNone/>
-            </a:pPr>
-            <a:endParaRPr lang="en-US" dirty="0"/>
-          </a:p>
-        </p:txBody>
-      </p:sp>
-      <p:sp>
-        <p:nvSpPr>
-          <p:cNvPr id="4" name="Date Placeholder 3"/>
-          <p:cNvSpPr>
-            <a:spLocks noGrp="1"/>
-          </p:cNvSpPr>
-          <p:nvPr>
-            <p:ph type="dt" sz="half" idx="10"/>
-          </p:nvPr>
-        </p:nvSpPr>
-        <p:spPr/>
-        <p:txBody>
-          <a:bodyPr/>
-          <a:lstStyle/>
-          <a:p>
-            <a:fld id="{7053BEFA-1175-F644-B249-7D41D72BD3FF}" type="datetime1">
-              <a:rPr lang="en-US" smtClean="0"/>
-              <a:t>1/22/14</a:t>
-            </a:fld>
-            <a:endParaRPr lang="en-US"/>
-          </a:p>
-        </p:txBody>
-      </p:sp>
-      <p:sp>
-        <p:nvSpPr>
-          <p:cNvPr id="5" name="Footer Placeholder 4"/>
-          <p:cNvSpPr>
-            <a:spLocks noGrp="1"/>
-          </p:cNvSpPr>
-          <p:nvPr>
-            <p:ph type="ftr" sz="quarter" idx="11"/>
-          </p:nvPr>
-        </p:nvSpPr>
-        <p:spPr/>
-        <p:txBody>
-          <a:bodyPr/>
-          <a:lstStyle/>
-          <a:p>
-            <a:endParaRPr lang="en-US" dirty="0"/>
-          </a:p>
-        </p:txBody>
-      </p:sp>
-      <p:sp>
-        <p:nvSpPr>
-          <p:cNvPr id="6" name="Slide Number Placeholder 5"/>
-          <p:cNvSpPr>
-            <a:spLocks noGrp="1"/>
-          </p:cNvSpPr>
-          <p:nvPr>
-            <p:ph type="sldNum" sz="quarter" idx="12"/>
-          </p:nvPr>
-        </p:nvSpPr>
-        <p:spPr/>
-        <p:txBody>
-          <a:bodyPr/>
-          <a:lstStyle/>
-          <a:p>
-            <a:fld id="{17E276FA-8F89-B34D-A726-BE3FA1F8DD97}" type="slidenum">
-              <a:rPr lang="en-US" smtClean="0"/>
-              <a:t>33</a:t>
-            </a:fld>
-            <a:endParaRPr lang="en-US" dirty="0"/>
-          </a:p>
-        </p:txBody>
-      </p:sp>
-      <p:sp>
-        <p:nvSpPr>
-          <p:cNvPr id="7" name="Action Button: Custom 6">
-            <a:hlinkClick r:id="" action="ppaction://noaction" highlightClick="1"/>
-          </p:cNvPr>
-          <p:cNvSpPr/>
-          <p:nvPr/>
-        </p:nvSpPr>
-        <p:spPr>
-          <a:xfrm>
-            <a:off x="2895600" y="3352800"/>
-            <a:ext cx="2565400" cy="685800"/>
-          </a:xfrm>
-          <a:prstGeom prst="actionButtonBlank">
-            <a:avLst/>
-          </a:prstGeom>
-          <a:solidFill>
-            <a:schemeClr val="accent2"/>
-          </a:solidFill>
-        </p:spPr>
-        <p:style>
-          <a:lnRef idx="1">
-            <a:schemeClr val="accent2"/>
-          </a:lnRef>
-          <a:fillRef idx="3">
-            <a:schemeClr val="accent2"/>
-          </a:fillRef>
-          <a:effectRef idx="2">
-            <a:schemeClr val="accent2"/>
-          </a:effectRef>
-          <a:fontRef idx="minor">
-            <a:schemeClr val="lt1"/>
-          </a:fontRef>
-        </p:style>
-        <p:txBody>
-          <a:bodyPr rtlCol="0" anchor="ctr"/>
-          <a:lstStyle/>
-          <a:p>
-            <a:pPr algn="ctr"/>
-            <a:r>
-              <a:rPr lang="en-US" dirty="0" smtClean="0"/>
-              <a:t>Yes, I grant access</a:t>
-            </a:r>
-            <a:endParaRPr lang="en-US" dirty="0"/>
-          </a:p>
-        </p:txBody>
-      </p:sp>
-      <p:sp>
-        <p:nvSpPr>
-          <p:cNvPr id="8" name="Action Button: Custom 7">
-            <a:hlinkClick r:id="" action="ppaction://noaction" highlightClick="1"/>
-          </p:cNvPr>
-          <p:cNvSpPr/>
-          <p:nvPr/>
-        </p:nvSpPr>
-        <p:spPr>
-          <a:xfrm>
-            <a:off x="2895600" y="4241800"/>
-            <a:ext cx="2565400" cy="685800"/>
-          </a:xfrm>
-          <a:prstGeom prst="actionButtonBlank">
-            <a:avLst/>
-          </a:prstGeom>
-        </p:spPr>
-        <p:style>
-          <a:lnRef idx="1">
-            <a:schemeClr val="accent1"/>
-          </a:lnRef>
-          <a:fillRef idx="3">
-            <a:schemeClr val="accent1"/>
-          </a:fillRef>
-          <a:effectRef idx="2">
-            <a:schemeClr val="accent1"/>
-          </a:effectRef>
-          <a:fontRef idx="minor">
-            <a:schemeClr val="lt1"/>
-          </a:fontRef>
-        </p:style>
-        <p:txBody>
-          <a:bodyPr rtlCol="0" anchor="ctr"/>
-          <a:lstStyle/>
-          <a:p>
-            <a:pPr algn="ctr"/>
-            <a:r>
-              <a:rPr lang="en-US" dirty="0" smtClean="0"/>
-              <a:t>No, I don’t grant access</a:t>
-            </a:r>
-            <a:endParaRPr lang="en-US" dirty="0"/>
-          </a:p>
-        </p:txBody>
-      </p:sp>
-    </p:spTree>
-    <p:extLst>
-      <p:ext uri="{BB962C8B-B14F-4D97-AF65-F5344CB8AC3E}">
-        <p14:creationId xmlns:p14="http://schemas.microsoft.com/office/powerpoint/2010/main" val="429954321"/>
       </p:ext>
     </p:extLst>
   </p:cSld>
@@ -27166,16 +26475,54 @@
           <a:p>
             <a:r>
               <a:rPr lang="en-US" dirty="0" smtClean="0"/>
-              <a:t>Typical </a:t>
-            </a:r>
-            <a:r>
-              <a:rPr lang="en-US" dirty="0" err="1" smtClean="0"/>
-              <a:t>OAuth</a:t>
-            </a:r>
+              <a:t>Hi user!</a:t>
+            </a:r>
+            <a:endParaRPr lang="en-US" dirty="0"/>
+          </a:p>
+        </p:txBody>
+      </p:sp>
+      <p:sp>
+        <p:nvSpPr>
+          <p:cNvPr id="3" name="Content Placeholder 2"/>
+          <p:cNvSpPr>
+            <a:spLocks noGrp="1"/>
+          </p:cNvSpPr>
+          <p:nvPr>
+            <p:ph idx="1"/>
+          </p:nvPr>
+        </p:nvSpPr>
+        <p:spPr/>
+        <p:txBody>
+          <a:bodyPr/>
+          <a:lstStyle/>
+          <a:p>
+            <a:pPr marL="0" indent="0">
+              <a:buNone/>
+            </a:pPr>
             <a:r>
               <a:rPr lang="en-US" dirty="0" smtClean="0"/>
-              <a:t> 2.0 Flow</a:t>
-            </a:r>
+              <a:t>[served by </a:t>
+            </a:r>
+            <a:r>
+              <a:rPr lang="en-US" i="1" dirty="0" smtClean="0"/>
+              <a:t>Authorization Server, </a:t>
+            </a:r>
+            <a:r>
+              <a:rPr lang="en-US" dirty="0" smtClean="0"/>
+              <a:t>not you]</a:t>
+            </a:r>
+            <a:endParaRPr lang="en-US" i="1" dirty="0" smtClean="0"/>
+          </a:p>
+          <a:p>
+            <a:pPr marL="0" indent="0">
+              <a:buNone/>
+            </a:pPr>
+            <a:endParaRPr lang="en-US" dirty="0"/>
+          </a:p>
+          <a:p>
+            <a:pPr marL="0" indent="0">
+              <a:buNone/>
+            </a:pPr>
             <a:endParaRPr lang="en-US" dirty="0"/>
           </a:p>
         </p:txBody>
@@ -27197,7 +26544,7 @@
           <a:p>
             <a:fld id="{7053BEFA-1175-F644-B249-7D41D72BD3FF}" type="datetime1">
               <a:rPr lang="en-US" smtClean="0"/>
-              <a:t>1/22/14</a:t>
+              <a:t>1/26/14</a:t>
             </a:fld>
             <a:endParaRPr lang="en-US"/>
           </a:p>
@@ -27240,6 +26587,230 @@
             <a:fld id="{17E276FA-8F89-B34D-A726-BE3FA1F8DD97}" type="slidenum">
               <a:rPr lang="en-US" smtClean="0"/>
               <a:t>34</a:t>
+            </a:fld>
+            <a:endParaRPr lang="en-US" dirty="0"/>
+          </a:p>
+        </p:txBody>
+      </p:sp>
+      <p:sp>
+        <p:nvSpPr>
+          <p:cNvPr id="7" name="Action Button: Custom 6">
+            <a:hlinkClick r:id="" action="ppaction://noaction" highlightClick="1"/>
+          </p:cNvPr>
+          <p:cNvSpPr/>
+          <p:nvPr/>
+        </p:nvSpPr>
+        <p:spPr>
+          <a:xfrm>
+            <a:off x="2895600" y="3352800"/>
+            <a:ext cx="2565400" cy="685800"/>
+          </a:xfrm>
+          <a:prstGeom prst="actionButtonBlank">
+            <a:avLst/>
+          </a:prstGeom>
+          <a:solidFill>
+            <a:schemeClr val="accent2"/>
+          </a:solidFill>
+        </p:spPr>
+        <p:style>
+          <a:lnRef idx="1">
+            <a:schemeClr val="accent2"/>
+          </a:lnRef>
+          <a:fillRef idx="3">
+            <a:schemeClr val="accent2"/>
+          </a:fillRef>
+          <a:effectRef idx="2">
+            <a:schemeClr val="accent2"/>
+          </a:effectRef>
+          <a:fontRef idx="minor">
+            <a:schemeClr val="lt1"/>
+          </a:fontRef>
+        </p:style>
+        <p:txBody>
+          <a:bodyPr rtlCol="0" anchor="ctr"/>
+          <a:lstStyle/>
+          <a:p>
+            <a:pPr algn="ctr"/>
+            <a:r>
+              <a:rPr lang="en-US" dirty="0" smtClean="0"/>
+              <a:t>Yes, I grant access</a:t>
+            </a:r>
+            <a:endParaRPr lang="en-US" dirty="0"/>
+          </a:p>
+        </p:txBody>
+      </p:sp>
+      <p:sp>
+        <p:nvSpPr>
+          <p:cNvPr id="8" name="Action Button: Custom 7">
+            <a:hlinkClick r:id="" action="ppaction://noaction" highlightClick="1"/>
+          </p:cNvPr>
+          <p:cNvSpPr/>
+          <p:nvPr/>
+        </p:nvSpPr>
+        <p:spPr>
+          <a:xfrm>
+            <a:off x="2895600" y="4241800"/>
+            <a:ext cx="2565400" cy="685800"/>
+          </a:xfrm>
+          <a:prstGeom prst="actionButtonBlank">
+            <a:avLst/>
+          </a:prstGeom>
+        </p:spPr>
+        <p:style>
+          <a:lnRef idx="1">
+            <a:schemeClr val="accent1"/>
+          </a:lnRef>
+          <a:fillRef idx="3">
+            <a:schemeClr val="accent1"/>
+          </a:fillRef>
+          <a:effectRef idx="2">
+            <a:schemeClr val="accent1"/>
+          </a:effectRef>
+          <a:fontRef idx="minor">
+            <a:schemeClr val="lt1"/>
+          </a:fontRef>
+        </p:style>
+        <p:txBody>
+          <a:bodyPr rtlCol="0" anchor="ctr"/>
+          <a:lstStyle/>
+          <a:p>
+            <a:pPr algn="ctr"/>
+            <a:r>
+              <a:rPr lang="en-US" dirty="0" smtClean="0"/>
+              <a:t>No, I don’t grant access</a:t>
+            </a:r>
+            <a:endParaRPr lang="en-US" dirty="0"/>
+          </a:p>
+        </p:txBody>
+      </p:sp>
+    </p:spTree>
+    <p:extLst>
+      <p:ext uri="{BB962C8B-B14F-4D97-AF65-F5344CB8AC3E}">
+        <p14:creationId xmlns:p14="http://schemas.microsoft.com/office/powerpoint/2010/main" val="429954321"/>
+      </p:ext>
+    </p:extLst>
+  </p:cSld>
+  <p:clrMapOvr>
+    <a:masterClrMapping/>
+  </p:clrMapOvr>
+  <p:timing>
+    <p:tnLst>
+      <p:par>
+        <p:cTn xmlns:p14="http://schemas.microsoft.com/office/powerpoint/2010/main" id="1" dur="indefinite" restart="never" nodeType="tmRoot"/>
+      </p:par>
+    </p:tnLst>
+  </p:timing>
+</p:sld>
+</file>
+
+<file path=ppt/slides/slide35.xml><?xml version="1.0" encoding="utf-8"?>
+<p:sld xmlns:a="http://schemas.openxmlformats.org/drawingml/2006/main" xmlns:r="http://schemas.openxmlformats.org/officeDocument/2006/relationships" xmlns:p="http://schemas.openxmlformats.org/presentationml/2006/main">
+  <p:cSld>
+    <p:spTree>
+      <p:nvGrpSpPr>
+        <p:cNvPr id="1" name=""/>
+        <p:cNvGrpSpPr/>
+        <p:nvPr/>
+      </p:nvGrpSpPr>
+      <p:grpSpPr>
+        <a:xfrm>
+          <a:off x="0" y="0"/>
+          <a:ext cx="0" cy="0"/>
+          <a:chOff x="0" y="0"/>
+          <a:chExt cx="0" cy="0"/>
+        </a:xfrm>
+      </p:grpSpPr>
+      <p:sp>
+        <p:nvSpPr>
+          <p:cNvPr id="2" name="Title 1"/>
+          <p:cNvSpPr>
+            <a:spLocks noGrp="1"/>
+          </p:cNvSpPr>
+          <p:nvPr>
+            <p:ph type="title"/>
+          </p:nvPr>
+        </p:nvSpPr>
+        <p:spPr/>
+        <p:txBody>
+          <a:bodyPr/>
+          <a:lstStyle/>
+          <a:p>
+            <a:r>
+              <a:rPr lang="en-US" dirty="0" smtClean="0"/>
+              <a:t>Typical </a:t>
+            </a:r>
+            <a:r>
+              <a:rPr lang="en-US" dirty="0" err="1" smtClean="0"/>
+              <a:t>OAuth</a:t>
+            </a:r>
+            <a:r>
+              <a:rPr lang="en-US" dirty="0" smtClean="0"/>
+              <a:t> 2.0 Flow</a:t>
+            </a:r>
+            <a:endParaRPr lang="en-US" dirty="0"/>
+          </a:p>
+        </p:txBody>
+      </p:sp>
+      <p:sp>
+        <p:nvSpPr>
+          <p:cNvPr id="4" name="Date Placeholder 3"/>
+          <p:cNvSpPr>
+            <a:spLocks noGrp="1"/>
+          </p:cNvSpPr>
+          <p:nvPr>
+            <p:ph type="dt" sz="half" idx="10"/>
+          </p:nvPr>
+        </p:nvSpPr>
+        <p:spPr/>
+        <p:txBody>
+          <a:bodyPr/>
+          <a:lstStyle/>
+          <a:p>
+            <a:fld id="{7053BEFA-1175-F644-B249-7D41D72BD3FF}" type="datetime1">
+              <a:rPr lang="en-US" smtClean="0"/>
+              <a:t>1/26/14</a:t>
+            </a:fld>
+            <a:endParaRPr lang="en-US"/>
+          </a:p>
+        </p:txBody>
+      </p:sp>
+      <p:sp>
+        <p:nvSpPr>
+          <p:cNvPr id="5" name="Footer Placeholder 4"/>
+          <p:cNvSpPr>
+            <a:spLocks noGrp="1"/>
+          </p:cNvSpPr>
+          <p:nvPr>
+            <p:ph type="ftr" sz="quarter" idx="11"/>
+          </p:nvPr>
+        </p:nvSpPr>
+        <p:spPr/>
+        <p:txBody>
+          <a:bodyPr/>
+          <a:lstStyle/>
+          <a:p>
+            <a:endParaRPr lang="en-US" dirty="0"/>
+          </a:p>
+        </p:txBody>
+      </p:sp>
+      <p:sp>
+        <p:nvSpPr>
+          <p:cNvPr id="6" name="Slide Number Placeholder 5"/>
+          <p:cNvSpPr>
+            <a:spLocks noGrp="1"/>
+          </p:cNvSpPr>
+          <p:nvPr>
+            <p:ph type="sldNum" sz="quarter" idx="12"/>
+          </p:nvPr>
+        </p:nvSpPr>
+        <p:spPr/>
+        <p:txBody>
+          <a:bodyPr/>
+          <a:lstStyle/>
+          <a:p>
+            <a:fld id="{17E276FA-8F89-B34D-A726-BE3FA1F8DD97}" type="slidenum">
+              <a:rPr lang="en-US" smtClean="0"/>
+              <a:t>35</a:t>
             </a:fld>
             <a:endParaRPr lang="en-US" dirty="0"/>
           </a:p>
@@ -27592,7 +27163,7 @@
 </p:sld>
 </file>
 
-<file path=ppt/slides/slide35.xml><?xml version="1.0" encoding="utf-8"?>
+<file path=ppt/slides/slide36.xml><?xml version="1.0" encoding="utf-8"?>
 <p:sld xmlns:a="http://schemas.openxmlformats.org/drawingml/2006/main" xmlns:r="http://schemas.openxmlformats.org/officeDocument/2006/relationships" xmlns:p="http://schemas.openxmlformats.org/presentationml/2006/main">
   <p:cSld>
     <p:spTree>
@@ -27657,7 +27228,7 @@
           <a:p>
             <a:fld id="{7053BEFA-1175-F644-B249-7D41D72BD3FF}" type="datetime1">
               <a:rPr lang="en-US" smtClean="0"/>
-              <a:t>1/22/14</a:t>
+              <a:t>1/26/14</a:t>
             </a:fld>
             <a:endParaRPr lang="en-US"/>
           </a:p>
@@ -27699,7 +27270,7 @@
           <a:p>
             <a:fld id="{17E276FA-8F89-B34D-A726-BE3FA1F8DD97}" type="slidenum">
               <a:rPr lang="en-US" smtClean="0"/>
-              <a:t>35</a:t>
+              <a:t>36</a:t>
             </a:fld>
             <a:endParaRPr lang="en-US" dirty="0"/>
           </a:p>
@@ -28076,7 +27647,7 @@
 </p:sld>
 </file>
 
-<file path=ppt/slides/slide36.xml><?xml version="1.0" encoding="utf-8"?>
+<file path=ppt/slides/slide37.xml><?xml version="1.0" encoding="utf-8"?>
 <p:sld xmlns:a="http://schemas.openxmlformats.org/drawingml/2006/main" xmlns:r="http://schemas.openxmlformats.org/officeDocument/2006/relationships" xmlns:p="http://schemas.openxmlformats.org/presentationml/2006/main">
   <p:cSld>
     <p:spTree>
@@ -28141,7 +27712,7 @@
           <a:p>
             <a:fld id="{7053BEFA-1175-F644-B249-7D41D72BD3FF}" type="datetime1">
               <a:rPr lang="en-US" smtClean="0"/>
-              <a:t>1/23/14</a:t>
+              <a:t>1/26/14</a:t>
             </a:fld>
             <a:endParaRPr lang="en-US"/>
           </a:p>
@@ -28183,7 +27754,7 @@
           <a:p>
             <a:fld id="{17E276FA-8F89-B34D-A726-BE3FA1F8DD97}" type="slidenum">
               <a:rPr lang="en-US" smtClean="0"/>
-              <a:t>36</a:t>
+              <a:t>37</a:t>
             </a:fld>
             <a:endParaRPr lang="en-US" dirty="0"/>
           </a:p>
@@ -28554,7 +28125,7 @@
 </p:sld>
 </file>
 
-<file path=ppt/slides/slide37.xml><?xml version="1.0" encoding="utf-8"?>
+<file path=ppt/slides/slide38.xml><?xml version="1.0" encoding="utf-8"?>
 <p:sld xmlns:a="http://schemas.openxmlformats.org/drawingml/2006/main" xmlns:r="http://schemas.openxmlformats.org/officeDocument/2006/relationships" xmlns:p="http://schemas.openxmlformats.org/presentationml/2006/main">
   <p:cSld>
     <p:spTree>
@@ -28614,11 +28185,7 @@
             </a:pPr>
             <a:r>
               <a:rPr lang="en-US" dirty="0" smtClean="0"/>
-              <a:t>                   (1)</a:t>
-            </a:r>
-            <a:r>
-              <a:rPr lang="en-US" dirty="0" smtClean="0"/>
-              <a:t>	</a:t>
+              <a:t>                   (1)	</a:t>
             </a:r>
             <a:r>
               <a:rPr lang="en-US" dirty="0"/>
@@ -28626,13 +28193,8 @@
             </a:r>
             <a:r>
               <a:rPr lang="en-US" dirty="0" smtClean="0"/>
-              <a:t>		</a:t>
-            </a:r>
-            <a:r>
-              <a:rPr lang="en-US" dirty="0" smtClean="0"/>
-              <a:t>(1+)  </a:t>
-            </a:r>
-            <a:endParaRPr lang="en-US" dirty="0" smtClean="0"/>
+              <a:t>		(1+)  </a:t>
+            </a:r>
           </a:p>
           <a:p>
             <a:pPr marL="0" indent="0">
@@ -28679,7 +28241,7 @@
           <a:p>
             <a:fld id="{7053BEFA-1175-F644-B249-7D41D72BD3FF}" type="datetime1">
               <a:rPr lang="en-US" smtClean="0"/>
-              <a:t>1/23/14</a:t>
+              <a:t>1/26/14</a:t>
             </a:fld>
             <a:endParaRPr lang="en-US"/>
           </a:p>
@@ -28721,7 +28283,7 @@
           <a:p>
             <a:fld id="{17E276FA-8F89-B34D-A726-BE3FA1F8DD97}" type="slidenum">
               <a:rPr lang="en-US" smtClean="0"/>
-              <a:t>37</a:t>
+              <a:t>38</a:t>
             </a:fld>
             <a:endParaRPr lang="en-US" dirty="0"/>
           </a:p>
@@ -28857,7 +28419,7 @@
 </p:sld>
 </file>
 
-<file path=ppt/slides/slide38.xml><?xml version="1.0" encoding="utf-8"?>
+<file path=ppt/slides/slide39.xml><?xml version="1.0" encoding="utf-8"?>
 <p:sld xmlns:a="http://schemas.openxmlformats.org/drawingml/2006/main" xmlns:r="http://schemas.openxmlformats.org/officeDocument/2006/relationships" xmlns:p="http://schemas.openxmlformats.org/presentationml/2006/main">
   <p:cSld>
     <p:spTree>
@@ -28971,7 +28533,7 @@
           <a:p>
             <a:fld id="{7053BEFA-1175-F644-B249-7D41D72BD3FF}" type="datetime1">
               <a:rPr lang="en-US" smtClean="0"/>
-              <a:t>1/22/14</a:t>
+              <a:t>1/26/14</a:t>
             </a:fld>
             <a:endParaRPr lang="en-US"/>
           </a:p>
@@ -29013,7 +28575,7 @@
           <a:p>
             <a:fld id="{17E276FA-8F89-B34D-A726-BE3FA1F8DD97}" type="slidenum">
               <a:rPr lang="en-US" smtClean="0"/>
-              <a:t>38</a:t>
+              <a:t>39</a:t>
             </a:fld>
             <a:endParaRPr lang="en-US" dirty="0"/>
           </a:p>
@@ -29096,7 +28658,7 @@
           <a:p>
             <a:fld id="{111EEF3B-ABF2-AA4E-9E24-0C6256942674}" type="datetime1">
               <a:rPr lang="en-US" smtClean="0"/>
-              <a:t>1/22/14</a:t>
+              <a:t>1/26/14</a:t>
             </a:fld>
             <a:endParaRPr lang="en-US"/>
           </a:p>
@@ -29434,7 +28996,7 @@
           <a:p>
             <a:fld id="{111EEF3B-ABF2-AA4E-9E24-0C6256942674}" type="datetime1">
               <a:rPr lang="en-US" smtClean="0"/>
-              <a:t>1/22/14</a:t>
+              <a:t>1/26/14</a:t>
             </a:fld>
             <a:endParaRPr lang="en-US"/>
           </a:p>
@@ -32486,7 +32048,7 @@
           <a:p>
             <a:fld id="{7053BEFA-1175-F644-B249-7D41D72BD3FF}" type="datetime1">
               <a:rPr lang="en-US" smtClean="0"/>
-              <a:t>1/22/14</a:t>
+              <a:t>1/26/14</a:t>
             </a:fld>
             <a:endParaRPr lang="en-US"/>
           </a:p>
@@ -32794,7 +32356,7 @@
           <a:p>
             <a:fld id="{7053BEFA-1175-F644-B249-7D41D72BD3FF}" type="datetime1">
               <a:rPr lang="en-US" smtClean="0"/>
-              <a:t>1/22/14</a:t>
+              <a:t>1/26/14</a:t>
             </a:fld>
             <a:endParaRPr lang="en-US"/>
           </a:p>

</xml_diff>